<commit_message>
Adding updated slides and paper
Added slides outline and details about the paper.
</commit_message>
<xml_diff>
--- a/presentation/bhusa17_yogesh_swami.pptx
+++ b/presentation/bhusa17_yogesh_swami.pptx
@@ -5,13 +5,27 @@
     <p:sldMasterId id="2147483648" r:id="rId1"/>
   </p:sldMasterIdLst>
   <p:notesMasterIdLst>
-    <p:notesMasterId r:id="rId6"/>
+    <p:notesMasterId r:id="rId20"/>
   </p:notesMasterIdLst>
   <p:sldIdLst>
     <p:sldId id="256" r:id="rId2"/>
     <p:sldId id="257" r:id="rId3"/>
     <p:sldId id="259" r:id="rId4"/>
     <p:sldId id="258" r:id="rId5"/>
+    <p:sldId id="260" r:id="rId6"/>
+    <p:sldId id="261" r:id="rId7"/>
+    <p:sldId id="262" r:id="rId8"/>
+    <p:sldId id="263" r:id="rId9"/>
+    <p:sldId id="264" r:id="rId10"/>
+    <p:sldId id="270" r:id="rId11"/>
+    <p:sldId id="265" r:id="rId12"/>
+    <p:sldId id="274" r:id="rId13"/>
+    <p:sldId id="266" r:id="rId14"/>
+    <p:sldId id="273" r:id="rId15"/>
+    <p:sldId id="271" r:id="rId16"/>
+    <p:sldId id="272" r:id="rId17"/>
+    <p:sldId id="267" r:id="rId18"/>
+    <p:sldId id="268" r:id="rId19"/>
   </p:sldIdLst>
   <p:sldSz cx="12192000" cy="6858000"/>
   <p:notesSz cx="6858000" cy="9144000"/>
@@ -215,7 +229,7 @@
           <a:p>
             <a:fld id="{D05950A8-7D29-42E5-BF04-268604A9F382}" type="datetimeFigureOut">
               <a:rPr lang="en-US" smtClean="0"/>
-              <a:t>7/6/2017</a:t>
+              <a:t>7/15/2017</a:t>
             </a:fld>
             <a:endParaRPr lang="en-US"/>
           </a:p>
@@ -650,6 +664,90 @@
 </p:notes>
 </file>
 
+<file path=ppt/notesSlides/notesSlide3.xml><?xml version="1.0" encoding="utf-8"?>
+<p:notes xmlns:a="http://schemas.openxmlformats.org/drawingml/2006/main" xmlns:r="http://schemas.openxmlformats.org/officeDocument/2006/relationships" xmlns:p="http://schemas.openxmlformats.org/presentationml/2006/main">
+  <p:cSld>
+    <p:spTree>
+      <p:nvGrpSpPr>
+        <p:cNvPr id="1" name=""/>
+        <p:cNvGrpSpPr/>
+        <p:nvPr/>
+      </p:nvGrpSpPr>
+      <p:grpSpPr>
+        <a:xfrm>
+          <a:off x="0" y="0"/>
+          <a:ext cx="0" cy="0"/>
+          <a:chOff x="0" y="0"/>
+          <a:chExt cx="0" cy="0"/>
+        </a:xfrm>
+      </p:grpSpPr>
+      <p:sp>
+        <p:nvSpPr>
+          <p:cNvPr id="2" name="Slide Image Placeholder 1"/>
+          <p:cNvSpPr>
+            <a:spLocks noGrp="1" noRot="1" noChangeAspect="1"/>
+          </p:cNvSpPr>
+          <p:nvPr>
+            <p:ph type="sldImg"/>
+          </p:nvPr>
+        </p:nvSpPr>
+        <p:spPr/>
+      </p:sp>
+      <p:sp>
+        <p:nvSpPr>
+          <p:cNvPr id="3" name="Notes Placeholder 2"/>
+          <p:cNvSpPr>
+            <a:spLocks noGrp="1"/>
+          </p:cNvSpPr>
+          <p:nvPr>
+            <p:ph type="body" idx="1"/>
+          </p:nvPr>
+        </p:nvSpPr>
+        <p:spPr/>
+        <p:txBody>
+          <a:bodyPr/>
+          <a:lstStyle/>
+          <a:p>
+            <a:endParaRPr lang="en-US" dirty="0"/>
+          </a:p>
+        </p:txBody>
+      </p:sp>
+      <p:sp>
+        <p:nvSpPr>
+          <p:cNvPr id="4" name="Slide Number Placeholder 3"/>
+          <p:cNvSpPr>
+            <a:spLocks noGrp="1"/>
+          </p:cNvSpPr>
+          <p:nvPr>
+            <p:ph type="sldNum" sz="quarter" idx="10"/>
+          </p:nvPr>
+        </p:nvSpPr>
+        <p:spPr/>
+        <p:txBody>
+          <a:bodyPr/>
+          <a:lstStyle/>
+          <a:p>
+            <a:fld id="{BC62DBB3-CA1F-4185-9E97-9B426BC1F1DF}" type="slidenum">
+              <a:rPr lang="en-US" smtClean="0"/>
+              <a:t>6</a:t>
+            </a:fld>
+            <a:endParaRPr lang="en-US"/>
+          </a:p>
+        </p:txBody>
+      </p:sp>
+    </p:spTree>
+    <p:extLst>
+      <p:ext uri="{BB962C8B-B14F-4D97-AF65-F5344CB8AC3E}">
+        <p14:creationId xmlns:p14="http://schemas.microsoft.com/office/powerpoint/2010/main" val="1989754083"/>
+      </p:ext>
+    </p:extLst>
+  </p:cSld>
+  <p:clrMapOvr>
+    <a:masterClrMapping/>
+  </p:clrMapOvr>
+</p:notes>
+</file>
+
 <file path=ppt/slideLayouts/slideLayout1.xml><?xml version="1.0" encoding="utf-8"?>
 <p:sldLayout xmlns:a="http://schemas.openxmlformats.org/drawingml/2006/main" xmlns:r="http://schemas.openxmlformats.org/officeDocument/2006/relationships" xmlns:p="http://schemas.openxmlformats.org/presentationml/2006/main" type="title" preserve="1">
   <p:cSld name="Title Slide">
@@ -779,7 +877,7 @@
           <a:p>
             <a:fld id="{FA75F998-5F87-6E42-8922-48408A16CBB5}" type="datetimeFigureOut">
               <a:rPr lang="en-US" smtClean="0"/>
-              <a:t>7/6/2017</a:t>
+              <a:t>7/15/2017</a:t>
             </a:fld>
             <a:endParaRPr lang="en-US"/>
           </a:p>
@@ -947,7 +1045,7 @@
           <a:p>
             <a:fld id="{FA75F998-5F87-6E42-8922-48408A16CBB5}" type="datetimeFigureOut">
               <a:rPr lang="en-US" smtClean="0"/>
-              <a:t>7/6/2017</a:t>
+              <a:t>7/15/2017</a:t>
             </a:fld>
             <a:endParaRPr lang="en-US"/>
           </a:p>
@@ -1125,7 +1223,7 @@
           <a:p>
             <a:fld id="{FA75F998-5F87-6E42-8922-48408A16CBB5}" type="datetimeFigureOut">
               <a:rPr lang="en-US" smtClean="0"/>
-              <a:t>7/6/2017</a:t>
+              <a:t>7/15/2017</a:t>
             </a:fld>
             <a:endParaRPr lang="en-US"/>
           </a:p>
@@ -1293,7 +1391,7 @@
           <a:p>
             <a:fld id="{FA75F998-5F87-6E42-8922-48408A16CBB5}" type="datetimeFigureOut">
               <a:rPr lang="en-US" smtClean="0"/>
-              <a:t>7/6/2017</a:t>
+              <a:t>7/15/2017</a:t>
             </a:fld>
             <a:endParaRPr lang="en-US"/>
           </a:p>
@@ -1538,7 +1636,7 @@
           <a:p>
             <a:fld id="{FA75F998-5F87-6E42-8922-48408A16CBB5}" type="datetimeFigureOut">
               <a:rPr lang="en-US" smtClean="0"/>
-              <a:t>7/6/2017</a:t>
+              <a:t>7/15/2017</a:t>
             </a:fld>
             <a:endParaRPr lang="en-US"/>
           </a:p>
@@ -1767,7 +1865,7 @@
           <a:p>
             <a:fld id="{FA75F998-5F87-6E42-8922-48408A16CBB5}" type="datetimeFigureOut">
               <a:rPr lang="en-US" smtClean="0"/>
-              <a:t>7/6/2017</a:t>
+              <a:t>7/15/2017</a:t>
             </a:fld>
             <a:endParaRPr lang="en-US"/>
           </a:p>
@@ -2131,7 +2229,7 @@
           <a:p>
             <a:fld id="{FA75F998-5F87-6E42-8922-48408A16CBB5}" type="datetimeFigureOut">
               <a:rPr lang="en-US" smtClean="0"/>
-              <a:t>7/6/2017</a:t>
+              <a:t>7/15/2017</a:t>
             </a:fld>
             <a:endParaRPr lang="en-US"/>
           </a:p>
@@ -2248,7 +2346,7 @@
           <a:p>
             <a:fld id="{FA75F998-5F87-6E42-8922-48408A16CBB5}" type="datetimeFigureOut">
               <a:rPr lang="en-US" smtClean="0"/>
-              <a:t>7/6/2017</a:t>
+              <a:t>7/15/2017</a:t>
             </a:fld>
             <a:endParaRPr lang="en-US"/>
           </a:p>
@@ -2343,7 +2441,7 @@
           <a:p>
             <a:fld id="{FA75F998-5F87-6E42-8922-48408A16CBB5}" type="datetimeFigureOut">
               <a:rPr lang="en-US" smtClean="0"/>
-              <a:t>7/6/2017</a:t>
+              <a:t>7/15/2017</a:t>
             </a:fld>
             <a:endParaRPr lang="en-US"/>
           </a:p>
@@ -2618,7 +2716,7 @@
           <a:p>
             <a:fld id="{FA75F998-5F87-6E42-8922-48408A16CBB5}" type="datetimeFigureOut">
               <a:rPr lang="en-US" smtClean="0"/>
-              <a:t>7/6/2017</a:t>
+              <a:t>7/15/2017</a:t>
             </a:fld>
             <a:endParaRPr lang="en-US"/>
           </a:p>
@@ -2870,7 +2968,7 @@
           <a:p>
             <a:fld id="{FA75F998-5F87-6E42-8922-48408A16CBB5}" type="datetimeFigureOut">
               <a:rPr lang="en-US" smtClean="0"/>
-              <a:t>7/6/2017</a:t>
+              <a:t>7/15/2017</a:t>
             </a:fld>
             <a:endParaRPr lang="en-US"/>
           </a:p>
@@ -3087,7 +3185,7 @@
           <a:p>
             <a:fld id="{FA75F998-5F87-6E42-8922-48408A16CBB5}" type="datetimeFigureOut">
               <a:rPr lang="en-US" smtClean="0"/>
-              <a:t>7/6/2017</a:t>
+              <a:t>7/15/2017</a:t>
             </a:fld>
             <a:endParaRPr lang="en-US"/>
           </a:p>
@@ -3586,6 +3684,573 @@
 </p:sld>
 </file>
 
+<file path=ppt/slides/slide10.xml><?xml version="1.0" encoding="utf-8"?>
+<p:sld xmlns:a="http://schemas.openxmlformats.org/drawingml/2006/main" xmlns:r="http://schemas.openxmlformats.org/officeDocument/2006/relationships" xmlns:p="http://schemas.openxmlformats.org/presentationml/2006/main">
+  <p:cSld>
+    <p:spTree>
+      <p:nvGrpSpPr>
+        <p:cNvPr id="1" name=""/>
+        <p:cNvGrpSpPr/>
+        <p:nvPr/>
+      </p:nvGrpSpPr>
+      <p:grpSpPr>
+        <a:xfrm>
+          <a:off x="0" y="0"/>
+          <a:ext cx="0" cy="0"/>
+          <a:chOff x="0" y="0"/>
+          <a:chExt cx="0" cy="0"/>
+        </a:xfrm>
+      </p:grpSpPr>
+      <p:sp>
+        <p:nvSpPr>
+          <p:cNvPr id="2" name="Title 1">
+            <a:extLst>
+              <a:ext uri="{FF2B5EF4-FFF2-40B4-BE49-F238E27FC236}">
+                <a16:creationId xmlns:a16="http://schemas.microsoft.com/office/drawing/2014/main" id="{D07508BC-BF03-4430-AF11-EAA992AE8E28}"/>
+              </a:ext>
+            </a:extLst>
+          </p:cNvPr>
+          <p:cNvSpPr>
+            <a:spLocks noGrp="1"/>
+          </p:cNvSpPr>
+          <p:nvPr>
+            <p:ph type="title"/>
+          </p:nvPr>
+        </p:nvSpPr>
+        <p:spPr/>
+        <p:txBody>
+          <a:bodyPr/>
+          <a:lstStyle/>
+          <a:p>
+            <a:pPr algn="r"/>
+            <a:r>
+              <a:rPr lang="en-US" dirty="0">
+                <a:solidFill>
+                  <a:schemeClr val="bg1"/>
+                </a:solidFill>
+              </a:rPr>
+              <a:t>SGX Key Derivation</a:t>
+            </a:r>
+          </a:p>
+        </p:txBody>
+      </p:sp>
+    </p:spTree>
+    <p:extLst>
+      <p:ext uri="{BB962C8B-B14F-4D97-AF65-F5344CB8AC3E}">
+        <p14:creationId xmlns:p14="http://schemas.microsoft.com/office/powerpoint/2010/main" val="3218497947"/>
+      </p:ext>
+    </p:extLst>
+  </p:cSld>
+  <p:clrMapOvr>
+    <a:masterClrMapping/>
+  </p:clrMapOvr>
+</p:sld>
+</file>
+
+<file path=ppt/slides/slide11.xml><?xml version="1.0" encoding="utf-8"?>
+<p:sld xmlns:a="http://schemas.openxmlformats.org/drawingml/2006/main" xmlns:r="http://schemas.openxmlformats.org/officeDocument/2006/relationships" xmlns:p="http://schemas.openxmlformats.org/presentationml/2006/main">
+  <p:cSld>
+    <p:spTree>
+      <p:nvGrpSpPr>
+        <p:cNvPr id="1" name=""/>
+        <p:cNvGrpSpPr/>
+        <p:nvPr/>
+      </p:nvGrpSpPr>
+      <p:grpSpPr>
+        <a:xfrm>
+          <a:off x="0" y="0"/>
+          <a:ext cx="0" cy="0"/>
+          <a:chOff x="0" y="0"/>
+          <a:chExt cx="0" cy="0"/>
+        </a:xfrm>
+      </p:grpSpPr>
+      <p:sp>
+        <p:nvSpPr>
+          <p:cNvPr id="2" name="Title 1">
+            <a:extLst>
+              <a:ext uri="{FF2B5EF4-FFF2-40B4-BE49-F238E27FC236}">
+                <a16:creationId xmlns:a16="http://schemas.microsoft.com/office/drawing/2014/main" id="{D07508BC-BF03-4430-AF11-EAA992AE8E28}"/>
+              </a:ext>
+            </a:extLst>
+          </p:cNvPr>
+          <p:cNvSpPr>
+            <a:spLocks noGrp="1"/>
+          </p:cNvSpPr>
+          <p:nvPr>
+            <p:ph type="title"/>
+          </p:nvPr>
+        </p:nvSpPr>
+        <p:spPr/>
+        <p:txBody>
+          <a:bodyPr/>
+          <a:lstStyle/>
+          <a:p>
+            <a:pPr algn="r"/>
+            <a:r>
+              <a:rPr lang="en-US" dirty="0">
+                <a:solidFill>
+                  <a:schemeClr val="bg1"/>
+                </a:solidFill>
+              </a:rPr>
+              <a:t>Remote Attestation Overview (1)</a:t>
+            </a:r>
+          </a:p>
+        </p:txBody>
+      </p:sp>
+    </p:spTree>
+    <p:extLst>
+      <p:ext uri="{BB962C8B-B14F-4D97-AF65-F5344CB8AC3E}">
+        <p14:creationId xmlns:p14="http://schemas.microsoft.com/office/powerpoint/2010/main" val="158213879"/>
+      </p:ext>
+    </p:extLst>
+  </p:cSld>
+  <p:clrMapOvr>
+    <a:masterClrMapping/>
+  </p:clrMapOvr>
+</p:sld>
+</file>
+
+<file path=ppt/slides/slide12.xml><?xml version="1.0" encoding="utf-8"?>
+<p:sld xmlns:a="http://schemas.openxmlformats.org/drawingml/2006/main" xmlns:r="http://schemas.openxmlformats.org/officeDocument/2006/relationships" xmlns:p="http://schemas.openxmlformats.org/presentationml/2006/main">
+  <p:cSld>
+    <p:spTree>
+      <p:nvGrpSpPr>
+        <p:cNvPr id="1" name=""/>
+        <p:cNvGrpSpPr/>
+        <p:nvPr/>
+      </p:nvGrpSpPr>
+      <p:grpSpPr>
+        <a:xfrm>
+          <a:off x="0" y="0"/>
+          <a:ext cx="0" cy="0"/>
+          <a:chOff x="0" y="0"/>
+          <a:chExt cx="0" cy="0"/>
+        </a:xfrm>
+      </p:grpSpPr>
+      <p:sp>
+        <p:nvSpPr>
+          <p:cNvPr id="2" name="Title 1">
+            <a:extLst>
+              <a:ext uri="{FF2B5EF4-FFF2-40B4-BE49-F238E27FC236}">
+                <a16:creationId xmlns:a16="http://schemas.microsoft.com/office/drawing/2014/main" id="{D07508BC-BF03-4430-AF11-EAA992AE8E28}"/>
+              </a:ext>
+            </a:extLst>
+          </p:cNvPr>
+          <p:cNvSpPr>
+            <a:spLocks noGrp="1"/>
+          </p:cNvSpPr>
+          <p:nvPr>
+            <p:ph type="title"/>
+          </p:nvPr>
+        </p:nvSpPr>
+        <p:spPr/>
+        <p:txBody>
+          <a:bodyPr/>
+          <a:lstStyle/>
+          <a:p>
+            <a:pPr algn="r"/>
+            <a:r>
+              <a:rPr lang="en-US" dirty="0">
+                <a:solidFill>
+                  <a:schemeClr val="bg1"/>
+                </a:solidFill>
+              </a:rPr>
+              <a:t>Remote Attestation Overview (2)</a:t>
+            </a:r>
+          </a:p>
+        </p:txBody>
+      </p:sp>
+    </p:spTree>
+    <p:extLst>
+      <p:ext uri="{BB962C8B-B14F-4D97-AF65-F5344CB8AC3E}">
+        <p14:creationId xmlns:p14="http://schemas.microsoft.com/office/powerpoint/2010/main" val="3435531884"/>
+      </p:ext>
+    </p:extLst>
+  </p:cSld>
+  <p:clrMapOvr>
+    <a:masterClrMapping/>
+  </p:clrMapOvr>
+</p:sld>
+</file>
+
+<file path=ppt/slides/slide13.xml><?xml version="1.0" encoding="utf-8"?>
+<p:sld xmlns:a="http://schemas.openxmlformats.org/drawingml/2006/main" xmlns:r="http://schemas.openxmlformats.org/officeDocument/2006/relationships" xmlns:p="http://schemas.openxmlformats.org/presentationml/2006/main">
+  <p:cSld>
+    <p:spTree>
+      <p:nvGrpSpPr>
+        <p:cNvPr id="1" name=""/>
+        <p:cNvGrpSpPr/>
+        <p:nvPr/>
+      </p:nvGrpSpPr>
+      <p:grpSpPr>
+        <a:xfrm>
+          <a:off x="0" y="0"/>
+          <a:ext cx="0" cy="0"/>
+          <a:chOff x="0" y="0"/>
+          <a:chExt cx="0" cy="0"/>
+        </a:xfrm>
+      </p:grpSpPr>
+      <p:sp>
+        <p:nvSpPr>
+          <p:cNvPr id="2" name="Title 1">
+            <a:extLst>
+              <a:ext uri="{FF2B5EF4-FFF2-40B4-BE49-F238E27FC236}">
+                <a16:creationId xmlns:a16="http://schemas.microsoft.com/office/drawing/2014/main" id="{D07508BC-BF03-4430-AF11-EAA992AE8E28}"/>
+              </a:ext>
+            </a:extLst>
+          </p:cNvPr>
+          <p:cNvSpPr>
+            <a:spLocks noGrp="1"/>
+          </p:cNvSpPr>
+          <p:nvPr>
+            <p:ph type="title"/>
+          </p:nvPr>
+        </p:nvSpPr>
+        <p:spPr/>
+        <p:txBody>
+          <a:bodyPr/>
+          <a:lstStyle/>
+          <a:p>
+            <a:pPr algn="r"/>
+            <a:r>
+              <a:rPr lang="en-US" dirty="0">
+                <a:solidFill>
+                  <a:schemeClr val="bg1"/>
+                </a:solidFill>
+              </a:rPr>
+              <a:t>Enhanced Privacy ID (EPID)</a:t>
+            </a:r>
+          </a:p>
+        </p:txBody>
+      </p:sp>
+    </p:spTree>
+    <p:extLst>
+      <p:ext uri="{BB962C8B-B14F-4D97-AF65-F5344CB8AC3E}">
+        <p14:creationId xmlns:p14="http://schemas.microsoft.com/office/powerpoint/2010/main" val="2775942778"/>
+      </p:ext>
+    </p:extLst>
+  </p:cSld>
+  <p:clrMapOvr>
+    <a:masterClrMapping/>
+  </p:clrMapOvr>
+</p:sld>
+</file>
+
+<file path=ppt/slides/slide14.xml><?xml version="1.0" encoding="utf-8"?>
+<p:sld xmlns:a="http://schemas.openxmlformats.org/drawingml/2006/main" xmlns:r="http://schemas.openxmlformats.org/officeDocument/2006/relationships" xmlns:p="http://schemas.openxmlformats.org/presentationml/2006/main">
+  <p:cSld>
+    <p:spTree>
+      <p:nvGrpSpPr>
+        <p:cNvPr id="1" name=""/>
+        <p:cNvGrpSpPr/>
+        <p:nvPr/>
+      </p:nvGrpSpPr>
+      <p:grpSpPr>
+        <a:xfrm>
+          <a:off x="0" y="0"/>
+          <a:ext cx="0" cy="0"/>
+          <a:chOff x="0" y="0"/>
+          <a:chExt cx="0" cy="0"/>
+        </a:xfrm>
+      </p:grpSpPr>
+      <p:sp>
+        <p:nvSpPr>
+          <p:cNvPr id="2" name="Title 1">
+            <a:extLst>
+              <a:ext uri="{FF2B5EF4-FFF2-40B4-BE49-F238E27FC236}">
+                <a16:creationId xmlns:a16="http://schemas.microsoft.com/office/drawing/2014/main" id="{D07508BC-BF03-4430-AF11-EAA992AE8E28}"/>
+              </a:ext>
+            </a:extLst>
+          </p:cNvPr>
+          <p:cNvSpPr>
+            <a:spLocks noGrp="1"/>
+          </p:cNvSpPr>
+          <p:nvPr>
+            <p:ph type="title"/>
+          </p:nvPr>
+        </p:nvSpPr>
+        <p:spPr/>
+        <p:txBody>
+          <a:bodyPr/>
+          <a:lstStyle/>
+          <a:p>
+            <a:pPr algn="r"/>
+            <a:r>
+              <a:rPr lang="en-US" dirty="0">
+                <a:solidFill>
+                  <a:schemeClr val="bg1"/>
+                </a:solidFill>
+              </a:rPr>
+              <a:t>EPID Revocation</a:t>
+            </a:r>
+          </a:p>
+        </p:txBody>
+      </p:sp>
+    </p:spTree>
+    <p:extLst>
+      <p:ext uri="{BB962C8B-B14F-4D97-AF65-F5344CB8AC3E}">
+        <p14:creationId xmlns:p14="http://schemas.microsoft.com/office/powerpoint/2010/main" val="991554661"/>
+      </p:ext>
+    </p:extLst>
+  </p:cSld>
+  <p:clrMapOvr>
+    <a:masterClrMapping/>
+  </p:clrMapOvr>
+</p:sld>
+</file>
+
+<file path=ppt/slides/slide15.xml><?xml version="1.0" encoding="utf-8"?>
+<p:sld xmlns:a="http://schemas.openxmlformats.org/drawingml/2006/main" xmlns:r="http://schemas.openxmlformats.org/officeDocument/2006/relationships" xmlns:p="http://schemas.openxmlformats.org/presentationml/2006/main">
+  <p:cSld>
+    <p:spTree>
+      <p:nvGrpSpPr>
+        <p:cNvPr id="1" name=""/>
+        <p:cNvGrpSpPr/>
+        <p:nvPr/>
+      </p:nvGrpSpPr>
+      <p:grpSpPr>
+        <a:xfrm>
+          <a:off x="0" y="0"/>
+          <a:ext cx="0" cy="0"/>
+          <a:chOff x="0" y="0"/>
+          <a:chExt cx="0" cy="0"/>
+        </a:xfrm>
+      </p:grpSpPr>
+      <p:sp>
+        <p:nvSpPr>
+          <p:cNvPr id="2" name="Title 1">
+            <a:extLst>
+              <a:ext uri="{FF2B5EF4-FFF2-40B4-BE49-F238E27FC236}">
+                <a16:creationId xmlns:a16="http://schemas.microsoft.com/office/drawing/2014/main" id="{D07508BC-BF03-4430-AF11-EAA992AE8E28}"/>
+              </a:ext>
+            </a:extLst>
+          </p:cNvPr>
+          <p:cNvSpPr>
+            <a:spLocks noGrp="1"/>
+          </p:cNvSpPr>
+          <p:nvPr>
+            <p:ph type="title"/>
+          </p:nvPr>
+        </p:nvSpPr>
+        <p:spPr/>
+        <p:txBody>
+          <a:bodyPr/>
+          <a:lstStyle/>
+          <a:p>
+            <a:pPr algn="r"/>
+            <a:r>
+              <a:rPr lang="en-US" dirty="0">
+                <a:solidFill>
+                  <a:schemeClr val="bg1"/>
+                </a:solidFill>
+              </a:rPr>
+              <a:t>EPID Provisioning (1)</a:t>
+            </a:r>
+          </a:p>
+        </p:txBody>
+      </p:sp>
+    </p:spTree>
+    <p:extLst>
+      <p:ext uri="{BB962C8B-B14F-4D97-AF65-F5344CB8AC3E}">
+        <p14:creationId xmlns:p14="http://schemas.microsoft.com/office/powerpoint/2010/main" val="2896201715"/>
+      </p:ext>
+    </p:extLst>
+  </p:cSld>
+  <p:clrMapOvr>
+    <a:masterClrMapping/>
+  </p:clrMapOvr>
+</p:sld>
+</file>
+
+<file path=ppt/slides/slide16.xml><?xml version="1.0" encoding="utf-8"?>
+<p:sld xmlns:a="http://schemas.openxmlformats.org/drawingml/2006/main" xmlns:r="http://schemas.openxmlformats.org/officeDocument/2006/relationships" xmlns:p="http://schemas.openxmlformats.org/presentationml/2006/main">
+  <p:cSld>
+    <p:spTree>
+      <p:nvGrpSpPr>
+        <p:cNvPr id="1" name=""/>
+        <p:cNvGrpSpPr/>
+        <p:nvPr/>
+      </p:nvGrpSpPr>
+      <p:grpSpPr>
+        <a:xfrm>
+          <a:off x="0" y="0"/>
+          <a:ext cx="0" cy="0"/>
+          <a:chOff x="0" y="0"/>
+          <a:chExt cx="0" cy="0"/>
+        </a:xfrm>
+      </p:grpSpPr>
+      <p:sp>
+        <p:nvSpPr>
+          <p:cNvPr id="2" name="Title 1">
+            <a:extLst>
+              <a:ext uri="{FF2B5EF4-FFF2-40B4-BE49-F238E27FC236}">
+                <a16:creationId xmlns:a16="http://schemas.microsoft.com/office/drawing/2014/main" id="{D07508BC-BF03-4430-AF11-EAA992AE8E28}"/>
+              </a:ext>
+            </a:extLst>
+          </p:cNvPr>
+          <p:cNvSpPr>
+            <a:spLocks noGrp="1"/>
+          </p:cNvSpPr>
+          <p:nvPr>
+            <p:ph type="title"/>
+          </p:nvPr>
+        </p:nvSpPr>
+        <p:spPr/>
+        <p:txBody>
+          <a:bodyPr/>
+          <a:lstStyle/>
+          <a:p>
+            <a:pPr algn="r"/>
+            <a:r>
+              <a:rPr lang="en-US" dirty="0">
+                <a:solidFill>
+                  <a:schemeClr val="bg1"/>
+                </a:solidFill>
+              </a:rPr>
+              <a:t>EPID Provisioning (2)</a:t>
+            </a:r>
+          </a:p>
+        </p:txBody>
+      </p:sp>
+    </p:spTree>
+    <p:extLst>
+      <p:ext uri="{BB962C8B-B14F-4D97-AF65-F5344CB8AC3E}">
+        <p14:creationId xmlns:p14="http://schemas.microsoft.com/office/powerpoint/2010/main" val="2767877206"/>
+      </p:ext>
+    </p:extLst>
+  </p:cSld>
+  <p:clrMapOvr>
+    <a:masterClrMapping/>
+  </p:clrMapOvr>
+</p:sld>
+</file>
+
+<file path=ppt/slides/slide17.xml><?xml version="1.0" encoding="utf-8"?>
+<p:sld xmlns:a="http://schemas.openxmlformats.org/drawingml/2006/main" xmlns:r="http://schemas.openxmlformats.org/officeDocument/2006/relationships" xmlns:p="http://schemas.openxmlformats.org/presentationml/2006/main">
+  <p:cSld>
+    <p:spTree>
+      <p:nvGrpSpPr>
+        <p:cNvPr id="1" name=""/>
+        <p:cNvGrpSpPr/>
+        <p:nvPr/>
+      </p:nvGrpSpPr>
+      <p:grpSpPr>
+        <a:xfrm>
+          <a:off x="0" y="0"/>
+          <a:ext cx="0" cy="0"/>
+          <a:chOff x="0" y="0"/>
+          <a:chExt cx="0" cy="0"/>
+        </a:xfrm>
+      </p:grpSpPr>
+      <p:sp>
+        <p:nvSpPr>
+          <p:cNvPr id="2" name="Title 1">
+            <a:extLst>
+              <a:ext uri="{FF2B5EF4-FFF2-40B4-BE49-F238E27FC236}">
+                <a16:creationId xmlns:a16="http://schemas.microsoft.com/office/drawing/2014/main" id="{D07508BC-BF03-4430-AF11-EAA992AE8E28}"/>
+              </a:ext>
+            </a:extLst>
+          </p:cNvPr>
+          <p:cNvSpPr>
+            <a:spLocks noGrp="1"/>
+          </p:cNvSpPr>
+          <p:nvPr>
+            <p:ph type="title"/>
+          </p:nvPr>
+        </p:nvSpPr>
+        <p:spPr/>
+        <p:txBody>
+          <a:bodyPr/>
+          <a:lstStyle/>
+          <a:p>
+            <a:pPr algn="r"/>
+            <a:r>
+              <a:rPr lang="en-US" dirty="0">
+                <a:solidFill>
+                  <a:schemeClr val="bg1"/>
+                </a:solidFill>
+              </a:rPr>
+              <a:t>EPID Quoting Enclave</a:t>
+            </a:r>
+          </a:p>
+        </p:txBody>
+      </p:sp>
+    </p:spTree>
+    <p:extLst>
+      <p:ext uri="{BB962C8B-B14F-4D97-AF65-F5344CB8AC3E}">
+        <p14:creationId xmlns:p14="http://schemas.microsoft.com/office/powerpoint/2010/main" val="4020399910"/>
+      </p:ext>
+    </p:extLst>
+  </p:cSld>
+  <p:clrMapOvr>
+    <a:masterClrMapping/>
+  </p:clrMapOvr>
+</p:sld>
+</file>
+
+<file path=ppt/slides/slide18.xml><?xml version="1.0" encoding="utf-8"?>
+<p:sld xmlns:a="http://schemas.openxmlformats.org/drawingml/2006/main" xmlns:r="http://schemas.openxmlformats.org/officeDocument/2006/relationships" xmlns:p="http://schemas.openxmlformats.org/presentationml/2006/main">
+  <p:cSld>
+    <p:spTree>
+      <p:nvGrpSpPr>
+        <p:cNvPr id="1" name=""/>
+        <p:cNvGrpSpPr/>
+        <p:nvPr/>
+      </p:nvGrpSpPr>
+      <p:grpSpPr>
+        <a:xfrm>
+          <a:off x="0" y="0"/>
+          <a:ext cx="0" cy="0"/>
+          <a:chOff x="0" y="0"/>
+          <a:chExt cx="0" cy="0"/>
+        </a:xfrm>
+      </p:grpSpPr>
+      <p:sp>
+        <p:nvSpPr>
+          <p:cNvPr id="2" name="Title 1">
+            <a:extLst>
+              <a:ext uri="{FF2B5EF4-FFF2-40B4-BE49-F238E27FC236}">
+                <a16:creationId xmlns:a16="http://schemas.microsoft.com/office/drawing/2014/main" id="{D07508BC-BF03-4430-AF11-EAA992AE8E28}"/>
+              </a:ext>
+            </a:extLst>
+          </p:cNvPr>
+          <p:cNvSpPr>
+            <a:spLocks noGrp="1"/>
+          </p:cNvSpPr>
+          <p:nvPr>
+            <p:ph type="title"/>
+          </p:nvPr>
+        </p:nvSpPr>
+        <p:spPr/>
+        <p:txBody>
+          <a:bodyPr/>
+          <a:lstStyle/>
+          <a:p>
+            <a:pPr algn="r"/>
+            <a:r>
+              <a:rPr lang="en-US" dirty="0">
+                <a:solidFill>
+                  <a:schemeClr val="bg1"/>
+                </a:solidFill>
+              </a:rPr>
+              <a:t>EPID Quote Verification Pitfalls</a:t>
+            </a:r>
+          </a:p>
+        </p:txBody>
+      </p:sp>
+    </p:spTree>
+    <p:extLst>
+      <p:ext uri="{BB962C8B-B14F-4D97-AF65-F5344CB8AC3E}">
+        <p14:creationId xmlns:p14="http://schemas.microsoft.com/office/powerpoint/2010/main" val="416790091"/>
+      </p:ext>
+    </p:extLst>
+  </p:cSld>
+  <p:clrMapOvr>
+    <a:masterClrMapping/>
+  </p:clrMapOvr>
+</p:sld>
+</file>
+
 <file path=ppt/slides/slide2.xml><?xml version="1.0" encoding="utf-8"?>
 <p:sld xmlns:a="http://schemas.openxmlformats.org/drawingml/2006/main" xmlns:r="http://schemas.openxmlformats.org/officeDocument/2006/relationships" xmlns:p="http://schemas.openxmlformats.org/presentationml/2006/main">
   <p:cSld>
@@ -3645,7 +4310,7 @@
                   <a:schemeClr val="bg1"/>
                 </a:solidFill>
               </a:rPr>
-              <a:t>HW/SW Co-design crypto</a:t>
+              <a:t>HW/SW crypto co-design</a:t>
             </a:r>
             <a:endParaRPr lang="en-US" dirty="0"/>
           </a:p>
@@ -3669,7 +4334,7 @@
         </p:nvSpPr>
         <p:spPr>
           <a:xfrm>
-            <a:off x="332510" y="1782417"/>
+            <a:off x="279348" y="1601666"/>
             <a:ext cx="6953352" cy="4868282"/>
           </a:xfrm>
         </p:spPr>
@@ -3687,7 +4352,7 @@
           <a:p>
             <a:r>
               <a:rPr lang="en-US" sz="4000" dirty="0"/>
-              <a:t>Class-1 Simulator Attacks</a:t>
+              <a:t>Class-1 Simulation</a:t>
             </a:r>
           </a:p>
           <a:p>
@@ -3707,7 +4372,7 @@
           <a:p>
             <a:r>
               <a:rPr lang="en-US" sz="4000" dirty="0"/>
-              <a:t>Cass-2 Simulator Attacks</a:t>
+              <a:t>Cass-2 Simulation</a:t>
             </a:r>
           </a:p>
           <a:p>
@@ -3738,7 +4403,7 @@
                   <a:srgbClr val="006C31"/>
                 </a:solidFill>
               </a:rPr>
-              <a:t>SGX secure against both!</a:t>
+              <a:t>Intel SGX secure against both!</a:t>
             </a:r>
           </a:p>
         </p:txBody>
@@ -3792,7 +4457,7 @@
                   <a:schemeClr val="tx1"/>
                 </a:solidFill>
               </a:rPr>
-              <a:t>Class-1 Simulator Attack</a:t>
+              <a:t>Class-1 Simulator</a:t>
             </a:r>
           </a:p>
         </p:txBody>
@@ -4123,7 +4788,7 @@
                   <a:schemeClr val="tx1"/>
                 </a:solidFill>
               </a:rPr>
-              <a:t>Class-2 Simulator Attack</a:t>
+              <a:t>Class-2 Simulator</a:t>
             </a:r>
           </a:p>
         </p:txBody>
@@ -4534,7 +5199,7 @@
                   <a:schemeClr val="bg1"/>
                 </a:solidFill>
               </a:rPr>
-              <a:t>Common SGX Design Paradigm</a:t>
+              <a:t>Common SGX Enclave Design</a:t>
             </a:r>
             <a:endParaRPr lang="en-US" dirty="0"/>
           </a:p>
@@ -4569,14 +5234,22 @@
           <a:lstStyle/>
           <a:p>
             <a:r>
+              <a:rPr lang="en-US" b="1" dirty="0"/>
+              <a:t>STEP-1</a:t>
+            </a:r>
+            <a:r>
               <a:rPr lang="en-US" dirty="0"/>
-              <a:t>STEP-1: Define a generic Remote Attestation Scheme</a:t>
-            </a:r>
-          </a:p>
-          <a:p>
+              <a:t>: Define a generic Remote Attestation Scheme</a:t>
+            </a:r>
+          </a:p>
+          <a:p>
+            <a:r>
+              <a:rPr lang="en-US" b="1" dirty="0"/>
+              <a:t>STEP-2</a:t>
+            </a:r>
             <a:r>
               <a:rPr lang="en-US" dirty="0"/>
-              <a:t>STEP-2: Arbitrarily compose different cryptographic schemes</a:t>
+              <a:t>: Arbitrarily compose different cryptographic schemes</a:t>
             </a:r>
           </a:p>
           <a:p>
@@ -4633,8 +5306,12 @@
           </a:p>
           <a:p>
             <a:r>
+              <a:rPr lang="en-US" b="1" dirty="0"/>
+              <a:t>STEP-3</a:t>
+            </a:r>
+            <a:r>
               <a:rPr lang="en-US" dirty="0"/>
-              <a:t>STEP-3: Define a workflow that combines STEP-1 and STEP-2 to achieve the goal</a:t>
+              <a:t>: Define a workflow that combines STEP-1 and STEP-2 to achieve the goal</a:t>
             </a:r>
           </a:p>
           <a:p>
@@ -4677,7 +5354,7 @@
     <p:bg>
       <p:bgPr>
         <a:blipFill dpi="0" rotWithShape="1">
-          <a:blip r:embed="rId3">
+          <a:blip r:embed="rId2">
             <a:lum/>
           </a:blip>
           <a:srcRect/>
@@ -4704,113 +5381,2372 @@
       </p:grpSpPr>
       <p:sp>
         <p:nvSpPr>
-          <p:cNvPr id="4" name="TextBox 3">
+          <p:cNvPr id="9" name="Title 8">
             <a:extLst>
               <a:ext uri="{FF2B5EF4-FFF2-40B4-BE49-F238E27FC236}">
-                <a16:creationId xmlns:a16="http://schemas.microsoft.com/office/drawing/2014/main" id="{AD8158E8-60A8-4FE1-8C4B-540B1D826F3E}"/>
+                <a16:creationId xmlns:a16="http://schemas.microsoft.com/office/drawing/2014/main" id="{43985D61-1D37-4D17-8487-EDC331AD17C3}"/>
               </a:ext>
             </a:extLst>
           </p:cNvPr>
-          <p:cNvSpPr txBox="1"/>
+          <p:cNvSpPr>
+            <a:spLocks noGrp="1"/>
+          </p:cNvSpPr>
+          <p:nvPr>
+            <p:ph type="title"/>
+          </p:nvPr>
+        </p:nvSpPr>
+        <p:spPr/>
+        <p:txBody>
+          <a:bodyPr/>
+          <a:lstStyle/>
+          <a:p>
+            <a:pPr algn="r"/>
+            <a:r>
+              <a:rPr lang="en-US" dirty="0">
+                <a:solidFill>
+                  <a:schemeClr val="bg1"/>
+                </a:solidFill>
+              </a:rPr>
+              <a:t>Sequential Composition</a:t>
+            </a:r>
+            <a:endParaRPr lang="en-US" dirty="0"/>
+          </a:p>
+        </p:txBody>
+      </p:sp>
+      <p:sp>
+        <p:nvSpPr>
+          <p:cNvPr id="11" name="Content Placeholder 10">
+            <a:extLst>
+              <a:ext uri="{FF2B5EF4-FFF2-40B4-BE49-F238E27FC236}">
+                <a16:creationId xmlns:a16="http://schemas.microsoft.com/office/drawing/2014/main" id="{2C2855FD-0AE4-4DFC-BA2F-5D400AAED5C5}"/>
+              </a:ext>
+            </a:extLst>
+          </p:cNvPr>
+          <p:cNvSpPr>
+            <a:spLocks noGrp="1"/>
+          </p:cNvSpPr>
+          <p:nvPr>
+            <p:ph sz="half" idx="2"/>
+          </p:nvPr>
+        </p:nvSpPr>
+        <p:spPr>
+          <a:xfrm>
+            <a:off x="5735782" y="1706555"/>
+            <a:ext cx="6356384" cy="4860500"/>
+          </a:xfrm>
+        </p:spPr>
+        <p:txBody>
+          <a:bodyPr>
+            <a:normAutofit fontScale="92500" lnSpcReduction="10000"/>
+          </a:bodyPr>
+          <a:lstStyle/>
+          <a:p>
+            <a:r>
+              <a:rPr lang="en-US" dirty="0">
+                <a:solidFill>
+                  <a:srgbClr val="222222"/>
+                </a:solidFill>
+                <a:latin typeface="arial" panose="020B0604020202020204" pitchFamily="34" charset="0"/>
+              </a:rPr>
+              <a:t>Example vacuously broken</a:t>
+            </a:r>
+          </a:p>
+          <a:p>
+            <a:pPr lvl="1"/>
+            <a:r>
+              <a:rPr lang="en-US" dirty="0">
+                <a:solidFill>
+                  <a:srgbClr val="222222"/>
+                </a:solidFill>
+                <a:latin typeface="arial" panose="020B0604020202020204" pitchFamily="34" charset="0"/>
+              </a:rPr>
+              <a:t>Attacker runs attestation correctly</a:t>
+            </a:r>
+          </a:p>
+          <a:p>
+            <a:pPr lvl="1"/>
+            <a:r>
+              <a:rPr lang="en-US" dirty="0">
+                <a:solidFill>
+                  <a:srgbClr val="222222"/>
+                </a:solidFill>
+                <a:latin typeface="arial" panose="020B0604020202020204" pitchFamily="34" charset="0"/>
+              </a:rPr>
+              <a:t>Runs rest of the protocol outside the enclave</a:t>
+            </a:r>
+          </a:p>
+          <a:p>
+            <a:r>
+              <a:rPr lang="en-US" dirty="0"/>
+              <a:t>If |</a:t>
+            </a:r>
+            <a:r>
+              <a:rPr lang="en-US" dirty="0">
+                <a:sym typeface="Symbol" panose="05050102010706020507" pitchFamily="18" charset="2"/>
+              </a:rPr>
+              <a:t></a:t>
+            </a:r>
+            <a:r>
+              <a:rPr lang="en-US" baseline="-25000" dirty="0">
+                <a:sym typeface="Symbol" panose="05050102010706020507" pitchFamily="18" charset="2"/>
+              </a:rPr>
+              <a:t>1</a:t>
+            </a:r>
+            <a:r>
+              <a:rPr lang="en-US" dirty="0"/>
+              <a:t>| &gt; 2</a:t>
+            </a:r>
+            <a:r>
+              <a:rPr lang="en-US" baseline="30000" dirty="0"/>
+              <a:t>x </a:t>
+            </a:r>
+            <a:r>
+              <a:rPr lang="en-US" dirty="0"/>
+              <a:t>and the |</a:t>
+            </a:r>
+            <a:r>
+              <a:rPr lang="en-US" dirty="0">
+                <a:sym typeface="Symbol" panose="05050102010706020507" pitchFamily="18" charset="2"/>
+              </a:rPr>
+              <a:t></a:t>
+            </a:r>
+            <a:r>
+              <a:rPr lang="en-US" baseline="-25000" dirty="0">
+                <a:sym typeface="Symbol" panose="05050102010706020507" pitchFamily="18" charset="2"/>
+              </a:rPr>
+              <a:t>2</a:t>
+            </a:r>
+            <a:r>
+              <a:rPr lang="en-US" dirty="0"/>
+              <a:t>| &gt; 2</a:t>
+            </a:r>
+            <a:r>
+              <a:rPr lang="en-US" baseline="30000" dirty="0"/>
+              <a:t>y </a:t>
+            </a:r>
+            <a:r>
+              <a:rPr lang="en-US" dirty="0"/>
+              <a:t>then </a:t>
+            </a:r>
+          </a:p>
+          <a:p>
+            <a:pPr lvl="1"/>
+            <a:r>
+              <a:rPr lang="en-US" dirty="0">
+                <a:sym typeface="Symbol" panose="05050102010706020507" pitchFamily="18" charset="2"/>
+              </a:rPr>
+              <a:t></a:t>
+            </a:r>
+            <a:r>
+              <a:rPr lang="en-US" baseline="-25000" dirty="0">
+                <a:sym typeface="Symbol" panose="05050102010706020507" pitchFamily="18" charset="2"/>
+              </a:rPr>
+              <a:t>1</a:t>
+            </a:r>
+            <a:r>
+              <a:rPr lang="en-US" dirty="0"/>
+              <a:t> </a:t>
+            </a:r>
+            <a:r>
+              <a:rPr lang="en-US" dirty="0">
+                <a:sym typeface="Symbol" panose="05050102010706020507" pitchFamily="18" charset="2"/>
+              </a:rPr>
+              <a:t></a:t>
+            </a:r>
+            <a:r>
+              <a:rPr lang="en-US" baseline="-25000" dirty="0">
+                <a:sym typeface="Symbol" panose="05050102010706020507" pitchFamily="18" charset="2"/>
+              </a:rPr>
+              <a:t>2 </a:t>
+            </a:r>
+            <a:r>
+              <a:rPr lang="en-US" dirty="0">
+                <a:sym typeface="Symbol" panose="05050102010706020507" pitchFamily="18" charset="2"/>
+              </a:rPr>
+              <a:t> ≠ </a:t>
+            </a:r>
+            <a:r>
+              <a:rPr lang="en-US" baseline="-25000" dirty="0">
+                <a:sym typeface="Symbol" panose="05050102010706020507" pitchFamily="18" charset="2"/>
+              </a:rPr>
+              <a:t>2</a:t>
+            </a:r>
+            <a:r>
+              <a:rPr lang="en-US" dirty="0"/>
+              <a:t> </a:t>
+            </a:r>
+            <a:r>
+              <a:rPr lang="en-US" dirty="0">
+                <a:sym typeface="Symbol" panose="05050102010706020507" pitchFamily="18" charset="2"/>
+              </a:rPr>
+              <a:t></a:t>
+            </a:r>
+            <a:r>
+              <a:rPr lang="en-US" baseline="-25000" dirty="0">
+                <a:sym typeface="Symbol" panose="05050102010706020507" pitchFamily="18" charset="2"/>
+              </a:rPr>
+              <a:t>1</a:t>
+            </a:r>
+            <a:r>
+              <a:rPr lang="en-US" dirty="0">
+                <a:sym typeface="Symbol" panose="05050102010706020507" pitchFamily="18" charset="2"/>
+              </a:rPr>
+              <a:t> </a:t>
+            </a:r>
+          </a:p>
+          <a:p>
+            <a:pPr lvl="1"/>
+            <a:r>
+              <a:rPr lang="en-US" dirty="0">
+                <a:sym typeface="Symbol" panose="05050102010706020507" pitchFamily="18" charset="2"/>
+              </a:rPr>
+              <a:t>|</a:t>
+            </a:r>
+            <a:r>
+              <a:rPr lang="en-US" baseline="-25000" dirty="0" err="1">
+                <a:sym typeface="Symbol" panose="05050102010706020507" pitchFamily="18" charset="2"/>
+              </a:rPr>
+              <a:t>i</a:t>
+            </a:r>
+            <a:r>
+              <a:rPr lang="en-US" baseline="-25000" dirty="0">
+                <a:sym typeface="Symbol" panose="05050102010706020507" pitchFamily="18" charset="2"/>
+              </a:rPr>
+              <a:t></a:t>
+            </a:r>
+            <a:r>
+              <a:rPr lang="en-US" dirty="0"/>
+              <a:t> </a:t>
+            </a:r>
+            <a:r>
+              <a:rPr lang="en-US" dirty="0">
+                <a:sym typeface="Symbol" panose="05050102010706020507" pitchFamily="18" charset="2"/>
+              </a:rPr>
+              <a:t></a:t>
+            </a:r>
+            <a:r>
+              <a:rPr lang="en-US" baseline="-25000" dirty="0">
+                <a:sym typeface="Symbol" panose="05050102010706020507" pitchFamily="18" charset="2"/>
+              </a:rPr>
+              <a:t>j</a:t>
+            </a:r>
+            <a:r>
+              <a:rPr lang="en-US" dirty="0">
+                <a:sym typeface="Symbol" panose="05050102010706020507" pitchFamily="18" charset="2"/>
+              </a:rPr>
+              <a:t> | </a:t>
+            </a:r>
+            <a:r>
+              <a:rPr lang="en-US" dirty="0"/>
+              <a:t>≱ 2</a:t>
+            </a:r>
+            <a:r>
+              <a:rPr lang="en-US" baseline="30000" dirty="0"/>
+              <a:t>min{</a:t>
+            </a:r>
+            <a:r>
+              <a:rPr lang="en-US" baseline="30000" dirty="0" err="1"/>
+              <a:t>x,y</a:t>
+            </a:r>
+            <a:r>
+              <a:rPr lang="en-US" baseline="30000" dirty="0"/>
+              <a:t>} </a:t>
+            </a:r>
+          </a:p>
+          <a:p>
+            <a:pPr lvl="1"/>
+            <a:r>
+              <a:rPr lang="en-US" dirty="0"/>
+              <a:t>E.g., Mac-and-Encrypt vs. Encrypt-then-Mac</a:t>
+            </a:r>
+          </a:p>
+          <a:p>
+            <a:r>
+              <a:rPr lang="en-US" dirty="0"/>
+              <a:t>Sequential composition of protocols not always secure</a:t>
+            </a:r>
+          </a:p>
+          <a:p>
+            <a:pPr lvl="1"/>
+            <a:r>
+              <a:rPr lang="en-US" dirty="0">
+                <a:solidFill>
+                  <a:srgbClr val="C00000"/>
+                </a:solidFill>
+              </a:rPr>
+              <a:t>Enclave is a single protocol</a:t>
+            </a:r>
+          </a:p>
+          <a:p>
+            <a:pPr lvl="1"/>
+            <a:r>
+              <a:rPr lang="en-US" dirty="0"/>
+              <a:t>Broken mean </a:t>
+            </a:r>
+            <a:r>
+              <a:rPr lang="en-US" dirty="0">
+                <a:solidFill>
+                  <a:srgbClr val="C00000"/>
+                </a:solidFill>
+              </a:rPr>
+              <a:t>bounds of the enclave protocol </a:t>
+            </a:r>
+            <a:r>
+              <a:rPr lang="en-US" dirty="0"/>
+              <a:t>within known cryptanalysis limits</a:t>
+            </a:r>
+          </a:p>
+        </p:txBody>
+      </p:sp>
+      <p:pic>
+        <p:nvPicPr>
+          <p:cNvPr id="2" name="Picture 1">
+            <a:extLst>
+              <a:ext uri="{FF2B5EF4-FFF2-40B4-BE49-F238E27FC236}">
+                <a16:creationId xmlns:a16="http://schemas.microsoft.com/office/drawing/2014/main" id="{CD86F164-6098-466E-B4E1-743CAD138B9D}"/>
+              </a:ext>
+            </a:extLst>
+          </p:cNvPr>
+          <p:cNvPicPr>
+            <a:picLocks noChangeAspect="1"/>
+          </p:cNvPicPr>
           <p:nvPr/>
-        </p:nvSpPr>
+        </p:nvPicPr>
+        <p:blipFill>
+          <a:blip r:embed="rId3"/>
+          <a:stretch>
+            <a:fillRect/>
+          </a:stretch>
+        </p:blipFill>
         <p:spPr>
-          <a:xfrm flipH="1">
-            <a:off x="2625842" y="88018"/>
-            <a:ext cx="9412942" cy="1107996"/>
+          <a:xfrm>
+            <a:off x="185814" y="1787686"/>
+            <a:ext cx="5293542" cy="4513472"/>
           </a:xfrm>
           <a:prstGeom prst="rect">
             <a:avLst/>
           </a:prstGeom>
-          <a:noFill/>
         </p:spPr>
-        <p:txBody>
-          <a:bodyPr wrap="square" rtlCol="0">
-            <a:spAutoFit/>
-          </a:bodyPr>
-          <a:lstStyle/>
-          <a:p>
-            <a:pPr algn="r"/>
-            <a:r>
-              <a:rPr lang="en-US" sz="6600" dirty="0">
-                <a:solidFill>
-                  <a:schemeClr val="bg1"/>
-                </a:solidFill>
-              </a:rPr>
-              <a:t>Sequential Composition</a:t>
-            </a:r>
-          </a:p>
-        </p:txBody>
-      </p:sp>
-      <p:graphicFrame>
-        <p:nvGraphicFramePr>
-          <p:cNvPr id="5" name="Object 4">
-            <a:extLst>
-              <a:ext uri="{FF2B5EF4-FFF2-40B4-BE49-F238E27FC236}">
-                <a16:creationId xmlns:a16="http://schemas.microsoft.com/office/drawing/2014/main" id="{59FAD235-A87F-42A2-8010-252F4F4255BB}"/>
-              </a:ext>
-            </a:extLst>
-          </p:cNvPr>
-          <p:cNvGraphicFramePr>
-            <a:graphicFrameLocks noChangeAspect="1"/>
-          </p:cNvGraphicFramePr>
-          <p:nvPr>
-            <p:extLst/>
-          </p:nvPr>
-        </p:nvGraphicFramePr>
-        <p:xfrm>
-          <a:off x="195628" y="1383918"/>
-          <a:ext cx="5535264" cy="5415406"/>
-        </p:xfrm>
-        <a:graphic>
-          <a:graphicData uri="http://schemas.openxmlformats.org/presentationml/2006/ole">
-            <mc:AlternateContent xmlns:mc="http://schemas.openxmlformats.org/markup-compatibility/2006">
-              <mc:Choice xmlns:v="urn:schemas-microsoft-com:vml" Requires="v">
-                <p:oleObj spid="_x0000_s2069" name="Visio" r:id="rId4" imgW="3225918" imgH="3156094" progId="Visio.Drawing.15">
-                  <p:embed/>
-                </p:oleObj>
-              </mc:Choice>
-              <mc:Fallback>
-                <p:oleObj name="Visio" r:id="rId4" imgW="3225918" imgH="3156094" progId="Visio.Drawing.15">
-                  <p:embed/>
-                  <p:pic>
-                    <p:nvPicPr>
-                      <p:cNvPr id="5" name="Object 4">
-                        <a:extLst>
-                          <a:ext uri="{FF2B5EF4-FFF2-40B4-BE49-F238E27FC236}">
-                            <a16:creationId xmlns:a16="http://schemas.microsoft.com/office/drawing/2014/main" id="{59FAD235-A87F-42A2-8010-252F4F4255BB}"/>
-                          </a:ext>
-                        </a:extLst>
-                      </p:cNvPr>
-                      <p:cNvPicPr/>
-                      <p:nvPr/>
-                    </p:nvPicPr>
-                    <p:blipFill>
-                      <a:blip r:embed="rId5"/>
-                      <a:stretch>
-                        <a:fillRect/>
-                      </a:stretch>
-                    </p:blipFill>
-                    <p:spPr>
-                      <a:xfrm>
-                        <a:off x="195628" y="1383918"/>
-                        <a:ext cx="5535264" cy="5415406"/>
-                      </a:xfrm>
-                      <a:prstGeom prst="rect">
-                        <a:avLst/>
-                      </a:prstGeom>
-                    </p:spPr>
-                  </p:pic>
-                </p:oleObj>
-              </mc:Fallback>
-            </mc:AlternateContent>
-          </a:graphicData>
-        </a:graphic>
-      </p:graphicFrame>
+      </p:pic>
     </p:spTree>
     <p:extLst>
       <p:ext uri="{BB962C8B-B14F-4D97-AF65-F5344CB8AC3E}">
         <p14:creationId xmlns:p14="http://schemas.microsoft.com/office/powerpoint/2010/main" val="2120162758"/>
+      </p:ext>
+    </p:extLst>
+  </p:cSld>
+  <p:clrMapOvr>
+    <a:masterClrMapping/>
+  </p:clrMapOvr>
+</p:sld>
+</file>
+
+<file path=ppt/slides/slide5.xml><?xml version="1.0" encoding="utf-8"?>
+<p:sld xmlns:a="http://schemas.openxmlformats.org/drawingml/2006/main" xmlns:r="http://schemas.openxmlformats.org/officeDocument/2006/relationships" xmlns:p="http://schemas.openxmlformats.org/presentationml/2006/main">
+  <p:cSld>
+    <p:spTree>
+      <p:nvGrpSpPr>
+        <p:cNvPr id="1" name=""/>
+        <p:cNvGrpSpPr/>
+        <p:nvPr/>
+      </p:nvGrpSpPr>
+      <p:grpSpPr>
+        <a:xfrm>
+          <a:off x="0" y="0"/>
+          <a:ext cx="0" cy="0"/>
+          <a:chOff x="0" y="0"/>
+          <a:chExt cx="0" cy="0"/>
+        </a:xfrm>
+      </p:grpSpPr>
+      <p:sp>
+        <p:nvSpPr>
+          <p:cNvPr id="2" name="Title 1">
+            <a:extLst>
+              <a:ext uri="{FF2B5EF4-FFF2-40B4-BE49-F238E27FC236}">
+                <a16:creationId xmlns:a16="http://schemas.microsoft.com/office/drawing/2014/main" id="{94BD596D-E60A-4B94-B98E-82EEB84C0112}"/>
+              </a:ext>
+            </a:extLst>
+          </p:cNvPr>
+          <p:cNvSpPr>
+            <a:spLocks noGrp="1"/>
+          </p:cNvSpPr>
+          <p:nvPr>
+            <p:ph type="title"/>
+          </p:nvPr>
+        </p:nvSpPr>
+        <p:spPr/>
+        <p:txBody>
+          <a:bodyPr/>
+          <a:lstStyle/>
+          <a:p>
+            <a:pPr algn="r"/>
+            <a:r>
+              <a:rPr lang="en-US" dirty="0">
+                <a:solidFill>
+                  <a:schemeClr val="bg1"/>
+                </a:solidFill>
+              </a:rPr>
+              <a:t>Concurrent Composition</a:t>
+            </a:r>
+          </a:p>
+        </p:txBody>
+      </p:sp>
+      <p:pic>
+        <p:nvPicPr>
+          <p:cNvPr id="7" name="Content Placeholder 6">
+            <a:extLst>
+              <a:ext uri="{FF2B5EF4-FFF2-40B4-BE49-F238E27FC236}">
+                <a16:creationId xmlns:a16="http://schemas.microsoft.com/office/drawing/2014/main" id="{49D58140-AAB7-498F-ACCA-1FEE413847F4}"/>
+              </a:ext>
+            </a:extLst>
+          </p:cNvPr>
+          <p:cNvPicPr>
+            <a:picLocks noGrp="1" noChangeAspect="1"/>
+          </p:cNvPicPr>
+          <p:nvPr>
+            <p:ph sz="half" idx="1"/>
+          </p:nvPr>
+        </p:nvPicPr>
+        <p:blipFill>
+          <a:blip r:embed="rId2"/>
+          <a:stretch>
+            <a:fillRect/>
+          </a:stretch>
+        </p:blipFill>
+        <p:spPr>
+          <a:xfrm>
+            <a:off x="416632" y="3486456"/>
+            <a:ext cx="4958319" cy="2690507"/>
+          </a:xfrm>
+          <a:prstGeom prst="rect">
+            <a:avLst/>
+          </a:prstGeom>
+        </p:spPr>
+      </p:pic>
+      <p:sp>
+        <p:nvSpPr>
+          <p:cNvPr id="5" name="Content Placeholder 4">
+            <a:extLst>
+              <a:ext uri="{FF2B5EF4-FFF2-40B4-BE49-F238E27FC236}">
+                <a16:creationId xmlns:a16="http://schemas.microsoft.com/office/drawing/2014/main" id="{1C0CEA00-C9F7-4019-B7E8-4978D64A11DB}"/>
+              </a:ext>
+            </a:extLst>
+          </p:cNvPr>
+          <p:cNvSpPr>
+            <a:spLocks noGrp="1"/>
+          </p:cNvSpPr>
+          <p:nvPr>
+            <p:ph sz="half" idx="2"/>
+          </p:nvPr>
+        </p:nvSpPr>
+        <p:spPr>
+          <a:xfrm>
+            <a:off x="5427723" y="1581134"/>
+            <a:ext cx="6982690" cy="5032375"/>
+          </a:xfrm>
+        </p:spPr>
+        <p:txBody>
+          <a:bodyPr>
+            <a:normAutofit/>
+          </a:bodyPr>
+          <a:lstStyle/>
+          <a:p>
+            <a:r>
+              <a:rPr lang="en-US" dirty="0"/>
+              <a:t>Attacker runs the same enclave concurrently</a:t>
+            </a:r>
+          </a:p>
+          <a:p>
+            <a:pPr lvl="1"/>
+            <a:r>
+              <a:rPr lang="en-US" dirty="0"/>
+              <a:t>Feed the same </a:t>
+            </a:r>
+            <a:r>
+              <a:rPr lang="en-US" dirty="0">
+                <a:latin typeface="Inconsolata" panose="020B0609030003000000" pitchFamily="49" charset="0"/>
+              </a:rPr>
+              <a:t>&lt;</a:t>
+            </a:r>
+            <a:r>
+              <a:rPr lang="en-US" dirty="0" err="1">
+                <a:solidFill>
+                  <a:srgbClr val="C00000"/>
+                </a:solidFill>
+                <a:latin typeface="Inconsolata" panose="020B0609030003000000" pitchFamily="49" charset="0"/>
+              </a:rPr>
+              <a:t>tpm_cntr</a:t>
+            </a:r>
+            <a:r>
+              <a:rPr lang="en-US" dirty="0" err="1"/>
+              <a:t>,</a:t>
+            </a:r>
+            <a:r>
+              <a:rPr lang="en-US" dirty="0" err="1">
+                <a:solidFill>
+                  <a:srgbClr val="C00000"/>
+                </a:solidFill>
+                <a:latin typeface="Inconsolata" panose="020B0609030003000000" pitchFamily="49" charset="0"/>
+              </a:rPr>
+              <a:t>tpm_sig</a:t>
+            </a:r>
+            <a:r>
+              <a:rPr lang="en-US" dirty="0">
+                <a:latin typeface="Inconsolata" panose="020B0609030003000000" pitchFamily="49" charset="0"/>
+              </a:rPr>
+              <a:t>&gt;</a:t>
+            </a:r>
+            <a:r>
+              <a:rPr lang="en-US" dirty="0"/>
+              <a:t> to both instances</a:t>
+            </a:r>
+          </a:p>
+          <a:p>
+            <a:r>
+              <a:rPr lang="en-US" dirty="0"/>
+              <a:t>Attacker runs different enclaves with same </a:t>
+            </a:r>
+            <a:r>
+              <a:rPr lang="en-US" dirty="0" err="1">
+                <a:solidFill>
+                  <a:srgbClr val="C00000"/>
+                </a:solidFill>
+                <a:latin typeface="Inconsolata" panose="020B0609030003000000" pitchFamily="49" charset="0"/>
+              </a:rPr>
+              <a:t>mrsigner</a:t>
+            </a:r>
+            <a:r>
+              <a:rPr lang="en-US" dirty="0"/>
+              <a:t> in parallel</a:t>
+            </a:r>
+          </a:p>
+          <a:p>
+            <a:r>
+              <a:rPr lang="en-US" dirty="0"/>
+              <a:t>SGX Has no in-built replay protection</a:t>
+            </a:r>
+          </a:p>
+          <a:p>
+            <a:pPr lvl="1"/>
+            <a:r>
+              <a:rPr lang="en-US" dirty="0"/>
+              <a:t>Adding TPM to TCB non-trivial</a:t>
+            </a:r>
+          </a:p>
+          <a:p>
+            <a:pPr lvl="1"/>
+            <a:r>
+              <a:rPr lang="en-US" dirty="0"/>
+              <a:t>TPM and CPU needs mutual </a:t>
+            </a:r>
+            <a:r>
+              <a:rPr lang="en-US" dirty="0" err="1"/>
+              <a:t>auth</a:t>
+            </a:r>
+            <a:r>
+              <a:rPr lang="en-US" dirty="0"/>
+              <a:t> (motherboard/CPU swap!)</a:t>
+            </a:r>
+          </a:p>
+          <a:p>
+            <a:r>
+              <a:rPr lang="en-US" dirty="0"/>
+              <a:t>Launch Enclave cannot limit concurrency</a:t>
+            </a:r>
+          </a:p>
+          <a:p>
+            <a:pPr lvl="1"/>
+            <a:r>
+              <a:rPr lang="en-US" dirty="0"/>
+              <a:t>EINITTOKEN is a long-term credential</a:t>
+            </a:r>
+          </a:p>
+          <a:p>
+            <a:pPr lvl="1"/>
+            <a:r>
+              <a:rPr lang="en-US" dirty="0"/>
+              <a:t>Whitelist ineffective</a:t>
+            </a:r>
+          </a:p>
+        </p:txBody>
+      </p:sp>
+      <p:pic>
+        <p:nvPicPr>
+          <p:cNvPr id="8" name="Picture 7">
+            <a:extLst>
+              <a:ext uri="{FF2B5EF4-FFF2-40B4-BE49-F238E27FC236}">
+                <a16:creationId xmlns:a16="http://schemas.microsoft.com/office/drawing/2014/main" id="{611A8DF2-DBFC-444C-BFE2-B39446247335}"/>
+              </a:ext>
+            </a:extLst>
+          </p:cNvPr>
+          <p:cNvPicPr>
+            <a:picLocks noChangeAspect="1"/>
+          </p:cNvPicPr>
+          <p:nvPr/>
+        </p:nvPicPr>
+        <p:blipFill>
+          <a:blip r:embed="rId3"/>
+          <a:stretch>
+            <a:fillRect/>
+          </a:stretch>
+        </p:blipFill>
+        <p:spPr>
+          <a:xfrm>
+            <a:off x="227628" y="1863030"/>
+            <a:ext cx="5147324" cy="1105104"/>
+          </a:xfrm>
+          <a:prstGeom prst="rect">
+            <a:avLst/>
+          </a:prstGeom>
+        </p:spPr>
+      </p:pic>
+    </p:spTree>
+    <p:extLst>
+      <p:ext uri="{BB962C8B-B14F-4D97-AF65-F5344CB8AC3E}">
+        <p14:creationId xmlns:p14="http://schemas.microsoft.com/office/powerpoint/2010/main" val="1259493157"/>
+      </p:ext>
+    </p:extLst>
+  </p:cSld>
+  <p:clrMapOvr>
+    <a:masterClrMapping/>
+  </p:clrMapOvr>
+</p:sld>
+</file>
+
+<file path=ppt/slides/slide6.xml><?xml version="1.0" encoding="utf-8"?>
+<p:sld xmlns:a="http://schemas.openxmlformats.org/drawingml/2006/main" xmlns:r="http://schemas.openxmlformats.org/officeDocument/2006/relationships" xmlns:p="http://schemas.openxmlformats.org/presentationml/2006/main">
+  <p:cSld>
+    <p:spTree>
+      <p:nvGrpSpPr>
+        <p:cNvPr id="1" name=""/>
+        <p:cNvGrpSpPr/>
+        <p:nvPr/>
+      </p:nvGrpSpPr>
+      <p:grpSpPr>
+        <a:xfrm>
+          <a:off x="0" y="0"/>
+          <a:ext cx="0" cy="0"/>
+          <a:chOff x="0" y="0"/>
+          <a:chExt cx="0" cy="0"/>
+        </a:xfrm>
+      </p:grpSpPr>
+      <p:sp>
+        <p:nvSpPr>
+          <p:cNvPr id="2" name="Title 1">
+            <a:extLst>
+              <a:ext uri="{FF2B5EF4-FFF2-40B4-BE49-F238E27FC236}">
+                <a16:creationId xmlns:a16="http://schemas.microsoft.com/office/drawing/2014/main" id="{16C25EFA-BE78-405A-9C8B-2573BD00BFB0}"/>
+              </a:ext>
+            </a:extLst>
+          </p:cNvPr>
+          <p:cNvSpPr>
+            <a:spLocks noGrp="1"/>
+          </p:cNvSpPr>
+          <p:nvPr>
+            <p:ph type="title"/>
+          </p:nvPr>
+        </p:nvSpPr>
+        <p:spPr/>
+        <p:txBody>
+          <a:bodyPr/>
+          <a:lstStyle/>
+          <a:p>
+            <a:pPr algn="r"/>
+            <a:r>
+              <a:rPr lang="en-US" dirty="0">
+                <a:solidFill>
+                  <a:schemeClr val="bg1"/>
+                </a:solidFill>
+              </a:rPr>
+              <a:t>SGX Computational Model</a:t>
+            </a:r>
+          </a:p>
+        </p:txBody>
+      </p:sp>
+      <p:sp>
+        <p:nvSpPr>
+          <p:cNvPr id="5" name="Content Placeholder 4">
+            <a:extLst>
+              <a:ext uri="{FF2B5EF4-FFF2-40B4-BE49-F238E27FC236}">
+                <a16:creationId xmlns:a16="http://schemas.microsoft.com/office/drawing/2014/main" id="{55214B38-583B-4A45-89B4-28E3EC897D3F}"/>
+              </a:ext>
+            </a:extLst>
+          </p:cNvPr>
+          <p:cNvSpPr>
+            <a:spLocks noGrp="1"/>
+          </p:cNvSpPr>
+          <p:nvPr>
+            <p:ph sz="half" idx="2"/>
+          </p:nvPr>
+        </p:nvSpPr>
+        <p:spPr>
+          <a:xfrm>
+            <a:off x="5334815" y="1825625"/>
+            <a:ext cx="6518155" cy="4961472"/>
+          </a:xfrm>
+        </p:spPr>
+        <p:txBody>
+          <a:bodyPr>
+            <a:normAutofit/>
+          </a:bodyPr>
+          <a:lstStyle/>
+          <a:p>
+            <a:r>
+              <a:rPr lang="en-US" dirty="0"/>
+              <a:t>SGX enclave </a:t>
+            </a:r>
+            <a:r>
+              <a:rPr lang="en-US" u="sng" dirty="0"/>
+              <a:t>is not</a:t>
+            </a:r>
+            <a:r>
+              <a:rPr lang="en-US" dirty="0"/>
+              <a:t> a black-box (Oracle)</a:t>
+            </a:r>
+          </a:p>
+          <a:p>
+            <a:pPr lvl="1"/>
+            <a:r>
+              <a:rPr lang="en-US" dirty="0"/>
+              <a:t>Adversary can force the enclave to exit at arbitrary execution point via AEX</a:t>
+            </a:r>
+          </a:p>
+          <a:p>
+            <a:pPr lvl="1"/>
+            <a:r>
+              <a:rPr lang="en-US" dirty="0"/>
+              <a:t>SGX allows making </a:t>
+            </a:r>
+            <a:r>
+              <a:rPr lang="en-US" dirty="0" err="1"/>
+              <a:t>ecalls</a:t>
+            </a:r>
+            <a:r>
+              <a:rPr lang="en-US" dirty="0"/>
+              <a:t> after retuning from interrupts</a:t>
+            </a:r>
+          </a:p>
+          <a:p>
+            <a:r>
+              <a:rPr lang="en-US" dirty="0"/>
+              <a:t>SGX allows multiple threads within the same enclave</a:t>
+            </a:r>
+          </a:p>
+          <a:p>
+            <a:pPr lvl="1"/>
+            <a:r>
+              <a:rPr lang="en-US" dirty="0">
+                <a:solidFill>
+                  <a:srgbClr val="C00000"/>
+                </a:solidFill>
+              </a:rPr>
+              <a:t>Select number of allowed threads carefully!</a:t>
+            </a:r>
+          </a:p>
+          <a:p>
+            <a:r>
+              <a:rPr lang="en-US" dirty="0"/>
+              <a:t>Makes global state in enclave malleable</a:t>
+            </a:r>
+          </a:p>
+          <a:p>
+            <a:r>
+              <a:rPr lang="en-US" dirty="0"/>
+              <a:t>Requires careful </a:t>
+            </a:r>
+            <a:r>
+              <a:rPr lang="en-US" dirty="0" err="1">
+                <a:latin typeface="Inconsolata" panose="020B0609030003000000" pitchFamily="49" charset="0"/>
+              </a:rPr>
+              <a:t>ecall</a:t>
+            </a:r>
+            <a:r>
+              <a:rPr lang="en-US" dirty="0"/>
+              <a:t> interface for Proof-of-Knowledge (</a:t>
+            </a:r>
+            <a:r>
+              <a:rPr lang="en-US" dirty="0" err="1"/>
+              <a:t>PoK</a:t>
+            </a:r>
+            <a:r>
+              <a:rPr lang="en-US" dirty="0"/>
+              <a:t>) protocols</a:t>
+            </a:r>
+          </a:p>
+        </p:txBody>
+      </p:sp>
+      <p:pic>
+        <p:nvPicPr>
+          <p:cNvPr id="11" name="Content Placeholder 10">
+            <a:extLst>
+              <a:ext uri="{FF2B5EF4-FFF2-40B4-BE49-F238E27FC236}">
+                <a16:creationId xmlns:a16="http://schemas.microsoft.com/office/drawing/2014/main" id="{CD29B4EC-FA67-4D9F-ACB1-E27C0A755AB3}"/>
+              </a:ext>
+            </a:extLst>
+          </p:cNvPr>
+          <p:cNvPicPr>
+            <a:picLocks noGrp="1" noChangeAspect="1"/>
+          </p:cNvPicPr>
+          <p:nvPr>
+            <p:ph sz="half" idx="1"/>
+          </p:nvPr>
+        </p:nvPicPr>
+        <p:blipFill>
+          <a:blip r:embed="rId3"/>
+          <a:stretch>
+            <a:fillRect/>
+          </a:stretch>
+        </p:blipFill>
+        <p:spPr>
+          <a:xfrm>
+            <a:off x="92905" y="1874398"/>
+            <a:ext cx="5358441" cy="4677987"/>
+          </a:xfrm>
+          <a:prstGeom prst="rect">
+            <a:avLst/>
+          </a:prstGeom>
+        </p:spPr>
+      </p:pic>
+      <p:sp>
+        <p:nvSpPr>
+          <p:cNvPr id="13" name="Multiplication Sign 12">
+            <a:extLst>
+              <a:ext uri="{FF2B5EF4-FFF2-40B4-BE49-F238E27FC236}">
+                <a16:creationId xmlns:a16="http://schemas.microsoft.com/office/drawing/2014/main" id="{D349E2E2-275D-4384-98F4-5A4914A26047}"/>
+              </a:ext>
+            </a:extLst>
+          </p:cNvPr>
+          <p:cNvSpPr/>
+          <p:nvPr/>
+        </p:nvSpPr>
+        <p:spPr>
+          <a:xfrm>
+            <a:off x="872429" y="1144222"/>
+            <a:ext cx="4462386" cy="3246854"/>
+          </a:xfrm>
+          <a:prstGeom prst="mathMultiply">
+            <a:avLst/>
+          </a:prstGeom>
+          <a:solidFill>
+            <a:srgbClr val="FF0000">
+              <a:alpha val="50000"/>
+            </a:srgbClr>
+          </a:solidFill>
+          <a:ln>
+            <a:solidFill>
+              <a:srgbClr val="C00000"/>
+            </a:solidFill>
+          </a:ln>
+        </p:spPr>
+        <p:style>
+          <a:lnRef idx="2">
+            <a:schemeClr val="accent1">
+              <a:shade val="50000"/>
+            </a:schemeClr>
+          </a:lnRef>
+          <a:fillRef idx="1">
+            <a:schemeClr val="accent1"/>
+          </a:fillRef>
+          <a:effectRef idx="0">
+            <a:schemeClr val="accent1"/>
+          </a:effectRef>
+          <a:fontRef idx="minor">
+            <a:schemeClr val="lt1"/>
+          </a:fontRef>
+        </p:style>
+        <p:txBody>
+          <a:bodyPr rtlCol="0" anchor="ctr"/>
+          <a:lstStyle/>
+          <a:p>
+            <a:pPr algn="ctr"/>
+            <a:endParaRPr lang="en-US"/>
+          </a:p>
+        </p:txBody>
+      </p:sp>
+    </p:spTree>
+    <p:extLst>
+      <p:ext uri="{BB962C8B-B14F-4D97-AF65-F5344CB8AC3E}">
+        <p14:creationId xmlns:p14="http://schemas.microsoft.com/office/powerpoint/2010/main" val="3719726987"/>
+      </p:ext>
+    </p:extLst>
+  </p:cSld>
+  <p:clrMapOvr>
+    <a:masterClrMapping/>
+  </p:clrMapOvr>
+  <p:timing>
+    <p:tnLst>
+      <p:par>
+        <p:cTn id="1" dur="indefinite" restart="never" nodeType="tmRoot">
+          <p:childTnLst>
+            <p:seq concurrent="1" nextAc="seek">
+              <p:cTn id="2" dur="indefinite" nodeType="mainSeq">
+                <p:childTnLst>
+                  <p:par>
+                    <p:cTn id="3" fill="hold">
+                      <p:stCondLst>
+                        <p:cond delay="indefinite"/>
+                      </p:stCondLst>
+                      <p:childTnLst>
+                        <p:par>
+                          <p:cTn id="4" fill="hold">
+                            <p:stCondLst>
+                              <p:cond delay="0"/>
+                            </p:stCondLst>
+                            <p:childTnLst>
+                              <p:par>
+                                <p:cTn id="5" presetID="1" presetClass="entr" presetSubtype="0" fill="hold" grpId="0" nodeType="clickEffect">
+                                  <p:stCondLst>
+                                    <p:cond delay="0"/>
+                                  </p:stCondLst>
+                                  <p:childTnLst>
+                                    <p:set>
+                                      <p:cBhvr>
+                                        <p:cTn id="6" dur="1" fill="hold">
+                                          <p:stCondLst>
+                                            <p:cond delay="0"/>
+                                          </p:stCondLst>
+                                        </p:cTn>
+                                        <p:tgtEl>
+                                          <p:spTgt spid="13"/>
+                                        </p:tgtEl>
+                                        <p:attrNameLst>
+                                          <p:attrName>style.visibility</p:attrName>
+                                        </p:attrNameLst>
+                                      </p:cBhvr>
+                                      <p:to>
+                                        <p:strVal val="visible"/>
+                                      </p:to>
+                                    </p:set>
+                                  </p:childTnLst>
+                                </p:cTn>
+                              </p:par>
+                            </p:childTnLst>
+                          </p:cTn>
+                        </p:par>
+                      </p:childTnLst>
+                    </p:cTn>
+                  </p:par>
+                </p:childTnLst>
+              </p:cTn>
+              <p:prevCondLst>
+                <p:cond evt="onPrev" delay="0">
+                  <p:tgtEl>
+                    <p:sldTgt/>
+                  </p:tgtEl>
+                </p:cond>
+              </p:prevCondLst>
+              <p:nextCondLst>
+                <p:cond evt="onNext" delay="0">
+                  <p:tgtEl>
+                    <p:sldTgt/>
+                  </p:tgtEl>
+                </p:cond>
+              </p:nextCondLst>
+            </p:seq>
+          </p:childTnLst>
+        </p:cTn>
+      </p:par>
+    </p:tnLst>
+    <p:bldLst>
+      <p:bldP spid="13" grpId="0" animBg="1"/>
+    </p:bldLst>
+  </p:timing>
+</p:sld>
+</file>
+
+<file path=ppt/slides/slide7.xml><?xml version="1.0" encoding="utf-8"?>
+<p:sld xmlns:a="http://schemas.openxmlformats.org/drawingml/2006/main" xmlns:r="http://schemas.openxmlformats.org/officeDocument/2006/relationships" xmlns:p="http://schemas.openxmlformats.org/presentationml/2006/main">
+  <p:cSld>
+    <p:spTree>
+      <p:nvGrpSpPr>
+        <p:cNvPr id="1" name=""/>
+        <p:cNvGrpSpPr/>
+        <p:nvPr/>
+      </p:nvGrpSpPr>
+      <p:grpSpPr>
+        <a:xfrm>
+          <a:off x="0" y="0"/>
+          <a:ext cx="0" cy="0"/>
+          <a:chOff x="0" y="0"/>
+          <a:chExt cx="0" cy="0"/>
+        </a:xfrm>
+      </p:grpSpPr>
+      <p:sp>
+        <p:nvSpPr>
+          <p:cNvPr id="2" name="Title 1">
+            <a:extLst>
+              <a:ext uri="{FF2B5EF4-FFF2-40B4-BE49-F238E27FC236}">
+                <a16:creationId xmlns:a16="http://schemas.microsoft.com/office/drawing/2014/main" id="{3C088CD1-ABC1-427C-AA6E-2D67CDB4956D}"/>
+              </a:ext>
+            </a:extLst>
+          </p:cNvPr>
+          <p:cNvSpPr>
+            <a:spLocks noGrp="1"/>
+          </p:cNvSpPr>
+          <p:nvPr>
+            <p:ph type="title"/>
+          </p:nvPr>
+        </p:nvSpPr>
+        <p:spPr>
+          <a:xfrm>
+            <a:off x="1185380" y="365125"/>
+            <a:ext cx="10515600" cy="1325563"/>
+          </a:xfrm>
+        </p:spPr>
+        <p:txBody>
+          <a:bodyPr/>
+          <a:lstStyle/>
+          <a:p>
+            <a:pPr algn="r"/>
+            <a:r>
+              <a:rPr lang="en-US" dirty="0">
+                <a:solidFill>
+                  <a:schemeClr val="bg1"/>
+                </a:solidFill>
+              </a:rPr>
+              <a:t>State Malleability and </a:t>
+            </a:r>
+            <a:r>
+              <a:rPr lang="en-US" dirty="0" err="1">
+                <a:solidFill>
+                  <a:schemeClr val="bg1"/>
+                </a:solidFill>
+              </a:rPr>
+              <a:t>PoK</a:t>
+            </a:r>
+            <a:r>
+              <a:rPr lang="en-US" dirty="0">
+                <a:solidFill>
+                  <a:schemeClr val="bg1"/>
+                </a:solidFill>
+              </a:rPr>
+              <a:t> extractor</a:t>
+            </a:r>
+          </a:p>
+        </p:txBody>
+      </p:sp>
+      <p:sp>
+        <p:nvSpPr>
+          <p:cNvPr id="3" name="Content Placeholder 2">
+            <a:extLst>
+              <a:ext uri="{FF2B5EF4-FFF2-40B4-BE49-F238E27FC236}">
+                <a16:creationId xmlns:a16="http://schemas.microsoft.com/office/drawing/2014/main" id="{3D2FA525-F179-4B5F-95BA-635ACA0E4A22}"/>
+              </a:ext>
+            </a:extLst>
+          </p:cNvPr>
+          <p:cNvSpPr>
+            <a:spLocks noGrp="1"/>
+          </p:cNvSpPr>
+          <p:nvPr>
+            <p:ph sz="half" idx="1"/>
+          </p:nvPr>
+        </p:nvSpPr>
+        <p:spPr>
+          <a:xfrm>
+            <a:off x="254272" y="1466952"/>
+            <a:ext cx="5765528" cy="5238648"/>
+          </a:xfrm>
+        </p:spPr>
+        <p:txBody>
+          <a:bodyPr>
+            <a:noAutofit/>
+          </a:bodyPr>
+          <a:lstStyle/>
+          <a:p>
+            <a:pPr marL="0" indent="0">
+              <a:buNone/>
+            </a:pPr>
+            <a:r>
+              <a:rPr lang="en-US" sz="1400" dirty="0">
+                <a:solidFill>
+                  <a:schemeClr val="accent2">
+                    <a:lumMod val="75000"/>
+                  </a:schemeClr>
+                </a:solidFill>
+                <a:latin typeface="Inconsolata" panose="020B0609030003000000" pitchFamily="49" charset="0"/>
+              </a:rPr>
+              <a:t>/* count of generals who have authorized launch. */ </a:t>
+            </a:r>
+            <a:br>
+              <a:rPr lang="en-US" sz="1400" dirty="0">
+                <a:latin typeface="Inconsolata" panose="020B0609030003000000" pitchFamily="49" charset="0"/>
+              </a:rPr>
+            </a:br>
+            <a:r>
+              <a:rPr lang="en-US" sz="1400" dirty="0">
+                <a:solidFill>
+                  <a:srgbClr val="0070C0"/>
+                </a:solidFill>
+                <a:latin typeface="Inconsolata" panose="020B0609030003000000" pitchFamily="49" charset="0"/>
+              </a:rPr>
+              <a:t>static </a:t>
+            </a:r>
+            <a:r>
+              <a:rPr lang="en-US" sz="1400" dirty="0" err="1">
+                <a:solidFill>
+                  <a:srgbClr val="0070C0"/>
+                </a:solidFill>
+                <a:latin typeface="Inconsolata" panose="020B0609030003000000" pitchFamily="49" charset="0"/>
+              </a:rPr>
+              <a:t>int</a:t>
+            </a:r>
+            <a:r>
+              <a:rPr lang="en-US" sz="1400" dirty="0">
+                <a:latin typeface="Inconsolata" panose="020B0609030003000000" pitchFamily="49" charset="0"/>
+              </a:rPr>
+              <a:t> </a:t>
+            </a:r>
+            <a:r>
+              <a:rPr lang="en-US" sz="1400" b="1" dirty="0" err="1">
+                <a:solidFill>
+                  <a:srgbClr val="C00000"/>
+                </a:solidFill>
+                <a:latin typeface="Inconsolata" panose="020B0609030003000000" pitchFamily="49" charset="0"/>
+              </a:rPr>
+              <a:t>auth_count</a:t>
+            </a:r>
+            <a:r>
+              <a:rPr lang="en-US" sz="1400" dirty="0">
+                <a:solidFill>
+                  <a:srgbClr val="C00000"/>
+                </a:solidFill>
+                <a:latin typeface="Inconsolata" panose="020B0609030003000000" pitchFamily="49" charset="0"/>
+              </a:rPr>
+              <a:t> </a:t>
+            </a:r>
+            <a:r>
+              <a:rPr lang="en-US" sz="1400" dirty="0">
+                <a:latin typeface="Inconsolata" panose="020B0609030003000000" pitchFamily="49" charset="0"/>
+              </a:rPr>
+              <a:t>= 0;</a:t>
+            </a:r>
+          </a:p>
+          <a:p>
+            <a:pPr marL="0" indent="0">
+              <a:buNone/>
+            </a:pPr>
+            <a:r>
+              <a:rPr lang="en-US" sz="1400" dirty="0">
+                <a:solidFill>
+                  <a:schemeClr val="accent2">
+                    <a:lumMod val="75000"/>
+                  </a:schemeClr>
+                </a:solidFill>
+                <a:latin typeface="Inconsolata" panose="020B0609030003000000" pitchFamily="49" charset="0"/>
+              </a:rPr>
+              <a:t>/* hardcoded list of generals and their PKs */</a:t>
+            </a:r>
+            <a:br>
+              <a:rPr lang="en-US" sz="1400" dirty="0">
+                <a:latin typeface="Inconsolata" panose="020B0609030003000000" pitchFamily="49" charset="0"/>
+              </a:rPr>
+            </a:br>
+            <a:r>
+              <a:rPr lang="en-US" sz="1400" dirty="0">
+                <a:solidFill>
+                  <a:srgbClr val="0070C0"/>
+                </a:solidFill>
+                <a:latin typeface="Inconsolata" panose="020B0609030003000000" pitchFamily="49" charset="0"/>
+              </a:rPr>
+              <a:t>struct</a:t>
+            </a:r>
+            <a:r>
+              <a:rPr lang="en-US" sz="1400" dirty="0">
+                <a:latin typeface="Inconsolata" panose="020B0609030003000000" pitchFamily="49" charset="0"/>
+              </a:rPr>
+              <a:t> </a:t>
+            </a:r>
+            <a:r>
+              <a:rPr lang="en-US" sz="1400" dirty="0" err="1">
+                <a:latin typeface="Inconsolata" panose="020B0609030003000000" pitchFamily="49" charset="0"/>
+              </a:rPr>
+              <a:t>general_info</a:t>
+            </a:r>
+            <a:r>
+              <a:rPr lang="en-US" sz="1400" dirty="0">
+                <a:latin typeface="Inconsolata" panose="020B0609030003000000" pitchFamily="49" charset="0"/>
+              </a:rPr>
+              <a:t>{</a:t>
+            </a:r>
+            <a:br>
+              <a:rPr lang="en-US" sz="1400" dirty="0">
+                <a:latin typeface="Inconsolata" panose="020B0609030003000000" pitchFamily="49" charset="0"/>
+              </a:rPr>
+            </a:br>
+            <a:r>
+              <a:rPr lang="en-US" sz="1400" dirty="0">
+                <a:latin typeface="Inconsolata" panose="020B0609030003000000" pitchFamily="49" charset="0"/>
+              </a:rPr>
+              <a:t>  </a:t>
+            </a:r>
+            <a:r>
+              <a:rPr lang="en-US" sz="1400" dirty="0">
+                <a:solidFill>
+                  <a:srgbClr val="0070C0"/>
+                </a:solidFill>
+                <a:latin typeface="Inconsolata" panose="020B0609030003000000" pitchFamily="49" charset="0"/>
+              </a:rPr>
+              <a:t>char</a:t>
+            </a:r>
+            <a:r>
+              <a:rPr lang="en-US" sz="1400" dirty="0">
+                <a:latin typeface="Inconsolata" panose="020B0609030003000000" pitchFamily="49" charset="0"/>
+              </a:rPr>
+              <a:t> </a:t>
+            </a:r>
+            <a:r>
+              <a:rPr lang="en-US" sz="1400" dirty="0" err="1">
+                <a:latin typeface="Inconsolata" panose="020B0609030003000000" pitchFamily="49" charset="0"/>
+              </a:rPr>
+              <a:t>general_name</a:t>
+            </a:r>
+            <a:r>
+              <a:rPr lang="en-US" sz="1400" dirty="0">
+                <a:latin typeface="Inconsolata" panose="020B0609030003000000" pitchFamily="49" charset="0"/>
+              </a:rPr>
+              <a:t>[256]; </a:t>
+            </a:r>
+            <a:br>
+              <a:rPr lang="en-US" sz="1400" dirty="0">
+                <a:latin typeface="Inconsolata" panose="020B0609030003000000" pitchFamily="49" charset="0"/>
+              </a:rPr>
+            </a:br>
+            <a:r>
+              <a:rPr lang="en-US" sz="1400" dirty="0">
+                <a:latin typeface="Inconsolata" panose="020B0609030003000000" pitchFamily="49" charset="0"/>
+              </a:rPr>
+              <a:t>  </a:t>
+            </a:r>
+            <a:r>
+              <a:rPr lang="en-US" sz="1400" dirty="0" err="1">
+                <a:solidFill>
+                  <a:srgbClr val="0070C0"/>
+                </a:solidFill>
+                <a:latin typeface="Inconsolata" panose="020B0609030003000000" pitchFamily="49" charset="0"/>
+              </a:rPr>
+              <a:t>const</a:t>
+            </a:r>
+            <a:r>
+              <a:rPr lang="en-US" sz="1400" dirty="0">
+                <a:latin typeface="Inconsolata" panose="020B0609030003000000" pitchFamily="49" charset="0"/>
+              </a:rPr>
+              <a:t> sgx_ec256_public_t </a:t>
+            </a:r>
+            <a:r>
+              <a:rPr lang="en-US" sz="1400" dirty="0" err="1">
+                <a:latin typeface="Inconsolata" panose="020B0609030003000000" pitchFamily="49" charset="0"/>
+              </a:rPr>
+              <a:t>general_pub</a:t>
+            </a:r>
+            <a:r>
+              <a:rPr lang="en-US" sz="1400" dirty="0">
+                <a:latin typeface="Inconsolata" panose="020B0609030003000000" pitchFamily="49" charset="0"/>
+              </a:rPr>
+              <a:t>; </a:t>
+            </a:r>
+            <a:br>
+              <a:rPr lang="en-US" sz="1400" dirty="0">
+                <a:latin typeface="Inconsolata" panose="020B0609030003000000" pitchFamily="49" charset="0"/>
+              </a:rPr>
+            </a:br>
+            <a:r>
+              <a:rPr lang="en-US" sz="1400" dirty="0">
+                <a:latin typeface="Inconsolata" panose="020B0609030003000000" pitchFamily="49" charset="0"/>
+              </a:rPr>
+              <a:t>  </a:t>
+            </a:r>
+            <a:r>
+              <a:rPr lang="en-US" sz="1400" dirty="0">
+                <a:solidFill>
+                  <a:srgbClr val="0070C0"/>
+                </a:solidFill>
+                <a:latin typeface="Inconsolata" panose="020B0609030003000000" pitchFamily="49" charset="0"/>
+              </a:rPr>
+              <a:t>bool</a:t>
+            </a:r>
+            <a:r>
+              <a:rPr lang="en-US" sz="1400" dirty="0">
+                <a:latin typeface="Inconsolata" panose="020B0609030003000000" pitchFamily="49" charset="0"/>
+              </a:rPr>
+              <a:t> </a:t>
+            </a:r>
+            <a:r>
+              <a:rPr lang="en-US" sz="1400" dirty="0" err="1">
+                <a:latin typeface="Inconsolata" panose="020B0609030003000000" pitchFamily="49" charset="0"/>
+              </a:rPr>
+              <a:t>has_authorized</a:t>
+            </a:r>
+            <a:r>
+              <a:rPr lang="en-US" sz="1400" dirty="0">
+                <a:latin typeface="Inconsolata" panose="020B0609030003000000" pitchFamily="49" charset="0"/>
+              </a:rPr>
+              <a:t>; </a:t>
+            </a:r>
+            <a:r>
+              <a:rPr lang="en-US" sz="1400" dirty="0">
+                <a:solidFill>
+                  <a:schemeClr val="accent2">
+                    <a:lumMod val="75000"/>
+                  </a:schemeClr>
+                </a:solidFill>
+                <a:latin typeface="Inconsolata" panose="020B0609030003000000" pitchFamily="49" charset="0"/>
+              </a:rPr>
+              <a:t>// initialized to false </a:t>
+            </a:r>
+            <a:br>
+              <a:rPr lang="en-US" sz="1400" dirty="0">
+                <a:latin typeface="Inconsolata" panose="020B0609030003000000" pitchFamily="49" charset="0"/>
+              </a:rPr>
+            </a:br>
+            <a:r>
+              <a:rPr lang="en-US" sz="1400" dirty="0">
+                <a:latin typeface="Inconsolata" panose="020B0609030003000000" pitchFamily="49" charset="0"/>
+              </a:rPr>
+              <a:t>}</a:t>
+            </a:r>
+            <a:r>
+              <a:rPr lang="en-US" sz="1400" b="1" dirty="0">
+                <a:solidFill>
+                  <a:srgbClr val="C00000"/>
+                </a:solidFill>
+                <a:latin typeface="Inconsolata" panose="020B0609030003000000" pitchFamily="49" charset="0"/>
+              </a:rPr>
+              <a:t>GENERALS</a:t>
+            </a:r>
+            <a:r>
+              <a:rPr lang="en-US" sz="1400" dirty="0">
+                <a:latin typeface="Inconsolata" panose="020B0609030003000000" pitchFamily="49" charset="0"/>
+              </a:rPr>
+              <a:t>[] = { ... };</a:t>
+            </a:r>
+          </a:p>
+          <a:p>
+            <a:pPr marL="0" indent="0">
+              <a:buNone/>
+            </a:pPr>
+            <a:r>
+              <a:rPr lang="en-US" sz="1400" dirty="0">
+                <a:solidFill>
+                  <a:schemeClr val="accent2">
+                    <a:lumMod val="75000"/>
+                  </a:schemeClr>
+                </a:solidFill>
+                <a:latin typeface="Inconsolata" panose="020B0609030003000000" pitchFamily="49" charset="0"/>
+              </a:rPr>
+              <a:t>/* </a:t>
+            </a:r>
+            <a:r>
+              <a:rPr lang="en-US" sz="1400" dirty="0" err="1">
+                <a:solidFill>
+                  <a:schemeClr val="accent2">
+                    <a:lumMod val="75000"/>
+                  </a:schemeClr>
+                </a:solidFill>
+                <a:latin typeface="Inconsolata" panose="020B0609030003000000" pitchFamily="49" charset="0"/>
+              </a:rPr>
+              <a:t>ecall</a:t>
+            </a:r>
+            <a:r>
+              <a:rPr lang="en-US" sz="1400" dirty="0">
+                <a:solidFill>
+                  <a:schemeClr val="accent2">
+                    <a:lumMod val="75000"/>
+                  </a:schemeClr>
+                </a:solidFill>
+                <a:latin typeface="Inconsolata" panose="020B0609030003000000" pitchFamily="49" charset="0"/>
+              </a:rPr>
+              <a:t> made by each general with a sig on name + aux data */ </a:t>
+            </a:r>
+            <a:r>
+              <a:rPr lang="en-US" sz="1400" dirty="0" err="1">
+                <a:solidFill>
+                  <a:srgbClr val="0070C0"/>
+                </a:solidFill>
+                <a:latin typeface="Inconsolata" panose="020B0609030003000000" pitchFamily="49" charset="0"/>
+              </a:rPr>
+              <a:t>int</a:t>
+            </a:r>
+            <a:r>
+              <a:rPr lang="en-US" sz="1400" dirty="0">
+                <a:latin typeface="Inconsolata" panose="020B0609030003000000" pitchFamily="49" charset="0"/>
+              </a:rPr>
+              <a:t> </a:t>
+            </a:r>
+            <a:r>
+              <a:rPr lang="en-US" sz="1400" b="1" dirty="0" err="1">
+                <a:solidFill>
+                  <a:srgbClr val="C00000"/>
+                </a:solidFill>
+                <a:latin typeface="Inconsolata" panose="020B0609030003000000" pitchFamily="49" charset="0"/>
+              </a:rPr>
+              <a:t>auth_and_launch</a:t>
+            </a:r>
+            <a:r>
+              <a:rPr lang="en-US" sz="1400" dirty="0">
+                <a:latin typeface="Inconsolata" panose="020B0609030003000000" pitchFamily="49" charset="0"/>
+              </a:rPr>
+              <a:t>(</a:t>
+            </a:r>
+            <a:r>
+              <a:rPr lang="en-US" sz="1400" dirty="0" err="1">
+                <a:solidFill>
+                  <a:srgbClr val="0070C0"/>
+                </a:solidFill>
+                <a:latin typeface="Inconsolata" panose="020B0609030003000000" pitchFamily="49" charset="0"/>
+              </a:rPr>
+              <a:t>const</a:t>
+            </a:r>
+            <a:r>
+              <a:rPr lang="en-US" sz="1400" dirty="0">
+                <a:solidFill>
+                  <a:srgbClr val="0070C0"/>
+                </a:solidFill>
+                <a:latin typeface="Inconsolata" panose="020B0609030003000000" pitchFamily="49" charset="0"/>
+              </a:rPr>
+              <a:t> char</a:t>
+            </a:r>
+            <a:r>
+              <a:rPr lang="en-US" sz="1400" dirty="0">
+                <a:latin typeface="Inconsolata" panose="020B0609030003000000" pitchFamily="49" charset="0"/>
+              </a:rPr>
+              <a:t>* </a:t>
+            </a:r>
+            <a:r>
+              <a:rPr lang="en-US" sz="1400" dirty="0" err="1">
+                <a:solidFill>
+                  <a:srgbClr val="0070C0"/>
+                </a:solidFill>
+                <a:latin typeface="Inconsolata" panose="020B0609030003000000" pitchFamily="49" charset="0"/>
+              </a:rPr>
+              <a:t>const</a:t>
+            </a:r>
+            <a:r>
+              <a:rPr lang="en-US" sz="1400" dirty="0">
+                <a:latin typeface="Inconsolata" panose="020B0609030003000000" pitchFamily="49" charset="0"/>
+              </a:rPr>
+              <a:t> </a:t>
+            </a:r>
+            <a:r>
+              <a:rPr lang="en-US" sz="1400" dirty="0" err="1">
+                <a:latin typeface="Inconsolata" panose="020B0609030003000000" pitchFamily="49" charset="0"/>
+              </a:rPr>
+              <a:t>general_name</a:t>
+            </a:r>
+            <a:r>
+              <a:rPr lang="en-US" sz="1400" dirty="0">
+                <a:latin typeface="Inconsolata" panose="020B0609030003000000" pitchFamily="49" charset="0"/>
+              </a:rPr>
+              <a:t>, </a:t>
+            </a:r>
+            <a:br>
+              <a:rPr lang="en-US" sz="1400" dirty="0">
+                <a:latin typeface="Inconsolata" panose="020B0609030003000000" pitchFamily="49" charset="0"/>
+              </a:rPr>
+            </a:br>
+            <a:r>
+              <a:rPr lang="en-US" sz="1400" dirty="0">
+                <a:latin typeface="Inconsolata" panose="020B0609030003000000" pitchFamily="49" charset="0"/>
+              </a:rPr>
+              <a:t>                    </a:t>
+            </a:r>
+            <a:r>
+              <a:rPr lang="en-US" sz="1400" dirty="0" err="1">
+                <a:solidFill>
+                  <a:srgbClr val="0070C0"/>
+                </a:solidFill>
+                <a:latin typeface="Inconsolata" panose="020B0609030003000000" pitchFamily="49" charset="0"/>
+              </a:rPr>
+              <a:t>const</a:t>
+            </a:r>
+            <a:r>
+              <a:rPr lang="en-US" sz="1400" dirty="0">
+                <a:latin typeface="Inconsolata" panose="020B0609030003000000" pitchFamily="49" charset="0"/>
+              </a:rPr>
+              <a:t> sgx_ec256_signature_t* sig){     </a:t>
+            </a:r>
+            <a:br>
+              <a:rPr lang="en-US" sz="1400" dirty="0">
+                <a:latin typeface="Inconsolata" panose="020B0609030003000000" pitchFamily="49" charset="0"/>
+              </a:rPr>
+            </a:br>
+            <a:r>
+              <a:rPr lang="en-US" sz="1400" dirty="0">
+                <a:latin typeface="Inconsolata" panose="020B0609030003000000" pitchFamily="49" charset="0"/>
+              </a:rPr>
+              <a:t>  </a:t>
+            </a:r>
+            <a:r>
+              <a:rPr lang="en-US" sz="1400" dirty="0">
+                <a:solidFill>
+                  <a:srgbClr val="0070C0"/>
+                </a:solidFill>
+                <a:latin typeface="Inconsolata" panose="020B0609030003000000" pitchFamily="49" charset="0"/>
+              </a:rPr>
+              <a:t>struct</a:t>
+            </a:r>
+            <a:r>
+              <a:rPr lang="en-US" sz="1400" dirty="0">
+                <a:latin typeface="Inconsolata" panose="020B0609030003000000" pitchFamily="49" charset="0"/>
+              </a:rPr>
+              <a:t> </a:t>
+            </a:r>
+            <a:r>
+              <a:rPr lang="en-US" sz="1400" dirty="0" err="1">
+                <a:latin typeface="Inconsolata" panose="020B0609030003000000" pitchFamily="49" charset="0"/>
+              </a:rPr>
+              <a:t>general_info</a:t>
+            </a:r>
+            <a:r>
+              <a:rPr lang="en-US" sz="1400" dirty="0">
+                <a:latin typeface="Inconsolata" panose="020B0609030003000000" pitchFamily="49" charset="0"/>
+              </a:rPr>
+              <a:t>* </a:t>
+            </a:r>
+            <a:r>
+              <a:rPr lang="en-US" sz="1400" dirty="0" err="1">
+                <a:latin typeface="Inconsolata" panose="020B0609030003000000" pitchFamily="49" charset="0"/>
+              </a:rPr>
+              <a:t>valid_general</a:t>
+            </a:r>
+            <a:r>
+              <a:rPr lang="en-US" sz="1400" dirty="0">
+                <a:latin typeface="Inconsolata" panose="020B0609030003000000" pitchFamily="49" charset="0"/>
+              </a:rPr>
+              <a:t> = </a:t>
+            </a:r>
+            <a:br>
+              <a:rPr lang="en-US" sz="1400" dirty="0">
+                <a:latin typeface="Inconsolata" panose="020B0609030003000000" pitchFamily="49" charset="0"/>
+              </a:rPr>
+            </a:br>
+            <a:r>
+              <a:rPr lang="en-US" sz="1400" dirty="0">
+                <a:latin typeface="Inconsolata" panose="020B0609030003000000" pitchFamily="49" charset="0"/>
+              </a:rPr>
+              <a:t>                </a:t>
+            </a:r>
+            <a:r>
+              <a:rPr lang="en-US" sz="1400" dirty="0" err="1">
+                <a:latin typeface="Inconsolata" panose="020B0609030003000000" pitchFamily="49" charset="0"/>
+              </a:rPr>
+              <a:t>validate_general</a:t>
+            </a:r>
+            <a:r>
+              <a:rPr lang="en-US" sz="1400" dirty="0">
+                <a:latin typeface="Inconsolata" panose="020B0609030003000000" pitchFamily="49" charset="0"/>
+              </a:rPr>
+              <a:t>(</a:t>
+            </a:r>
+            <a:r>
+              <a:rPr lang="en-US" sz="1400" dirty="0" err="1">
+                <a:latin typeface="Inconsolata" panose="020B0609030003000000" pitchFamily="49" charset="0"/>
+              </a:rPr>
+              <a:t>general_name</a:t>
+            </a:r>
+            <a:r>
+              <a:rPr lang="en-US" sz="1400" dirty="0">
+                <a:latin typeface="Inconsolata" panose="020B0609030003000000" pitchFamily="49" charset="0"/>
+              </a:rPr>
+              <a:t>, sig);</a:t>
+            </a:r>
+          </a:p>
+          <a:p>
+            <a:pPr marL="0" indent="0">
+              <a:buNone/>
+            </a:pPr>
+            <a:r>
+              <a:rPr lang="en-US" sz="1400" dirty="0">
+                <a:latin typeface="Inconsolata" panose="020B0609030003000000" pitchFamily="49" charset="0"/>
+              </a:rPr>
+              <a:t>  </a:t>
+            </a:r>
+            <a:r>
+              <a:rPr lang="en-US" sz="1400" dirty="0">
+                <a:solidFill>
+                  <a:srgbClr val="0070C0"/>
+                </a:solidFill>
+                <a:latin typeface="Inconsolata" panose="020B0609030003000000" pitchFamily="49" charset="0"/>
+              </a:rPr>
+              <a:t>if</a:t>
+            </a:r>
+            <a:r>
+              <a:rPr lang="en-US" sz="1400" dirty="0">
+                <a:latin typeface="Inconsolata" panose="020B0609030003000000" pitchFamily="49" charset="0"/>
+              </a:rPr>
+              <a:t>(!</a:t>
+            </a:r>
+            <a:r>
+              <a:rPr lang="en-US" sz="1400" dirty="0" err="1">
+                <a:latin typeface="Inconsolata" panose="020B0609030003000000" pitchFamily="49" charset="0"/>
+              </a:rPr>
+              <a:t>valid_general</a:t>
+            </a:r>
+            <a:r>
+              <a:rPr lang="en-US" sz="1400" dirty="0">
+                <a:latin typeface="Inconsolata" panose="020B0609030003000000" pitchFamily="49" charset="0"/>
+              </a:rPr>
+              <a:t>){ </a:t>
+            </a:r>
+            <a:r>
+              <a:rPr lang="en-US" sz="1400" dirty="0">
+                <a:solidFill>
+                  <a:srgbClr val="0070C0"/>
+                </a:solidFill>
+                <a:latin typeface="Inconsolata" panose="020B0609030003000000" pitchFamily="49" charset="0"/>
+              </a:rPr>
+              <a:t>return</a:t>
+            </a:r>
+            <a:r>
+              <a:rPr lang="en-US" sz="1400" dirty="0">
+                <a:latin typeface="Inconsolata" panose="020B0609030003000000" pitchFamily="49" charset="0"/>
+              </a:rPr>
+              <a:t> </a:t>
+            </a:r>
+            <a:r>
+              <a:rPr lang="en-US" sz="1400" dirty="0">
+                <a:solidFill>
+                  <a:srgbClr val="FF0000"/>
+                </a:solidFill>
+                <a:latin typeface="Inconsolata" panose="020B0609030003000000" pitchFamily="49" charset="0"/>
+              </a:rPr>
+              <a:t>INVALID_GENERAL</a:t>
+            </a:r>
+            <a:r>
+              <a:rPr lang="en-US" sz="1400" dirty="0">
+                <a:latin typeface="Inconsolata" panose="020B0609030003000000" pitchFamily="49" charset="0"/>
+              </a:rPr>
+              <a:t>; }</a:t>
+            </a:r>
+          </a:p>
+          <a:p>
+            <a:pPr marL="0" indent="0">
+              <a:buNone/>
+            </a:pPr>
+            <a:r>
+              <a:rPr lang="en-US" sz="1400" dirty="0">
+                <a:latin typeface="Inconsolata" panose="020B0609030003000000" pitchFamily="49" charset="0"/>
+              </a:rPr>
+              <a:t>  </a:t>
+            </a:r>
+            <a:r>
+              <a:rPr lang="en-US" sz="1400" dirty="0">
+                <a:solidFill>
+                  <a:srgbClr val="0070C0"/>
+                </a:solidFill>
+                <a:latin typeface="Inconsolata" panose="020B0609030003000000" pitchFamily="49" charset="0"/>
+              </a:rPr>
+              <a:t>if</a:t>
+            </a:r>
+            <a:r>
+              <a:rPr lang="en-US" sz="1400" dirty="0">
+                <a:latin typeface="Inconsolata" panose="020B0609030003000000" pitchFamily="49" charset="0"/>
+              </a:rPr>
+              <a:t>(!</a:t>
+            </a:r>
+            <a:r>
+              <a:rPr lang="en-US" sz="1400" dirty="0" err="1">
+                <a:latin typeface="Inconsolata" panose="020B0609030003000000" pitchFamily="49" charset="0"/>
+              </a:rPr>
+              <a:t>valid_general</a:t>
+            </a:r>
+            <a:r>
+              <a:rPr lang="en-US" sz="1400" dirty="0">
+                <a:latin typeface="Inconsolata" panose="020B0609030003000000" pitchFamily="49" charset="0"/>
+              </a:rPr>
+              <a:t>-&gt;</a:t>
+            </a:r>
+            <a:r>
+              <a:rPr lang="en-US" sz="1400" dirty="0" err="1">
+                <a:latin typeface="Inconsolata" panose="020B0609030003000000" pitchFamily="49" charset="0"/>
+              </a:rPr>
+              <a:t>has_authorized</a:t>
+            </a:r>
+            <a:r>
+              <a:rPr lang="en-US" sz="1400" dirty="0">
+                <a:latin typeface="Inconsolata" panose="020B0609030003000000" pitchFamily="49" charset="0"/>
+              </a:rPr>
+              <a:t>){  </a:t>
+            </a:r>
+            <a:br>
+              <a:rPr lang="en-US" sz="1400" dirty="0">
+                <a:latin typeface="Inconsolata" panose="020B0609030003000000" pitchFamily="49" charset="0"/>
+              </a:rPr>
+            </a:br>
+            <a:r>
+              <a:rPr lang="en-US" sz="1400" dirty="0">
+                <a:latin typeface="Inconsolata" panose="020B0609030003000000" pitchFamily="49" charset="0"/>
+              </a:rPr>
+              <a:t>    </a:t>
+            </a:r>
+            <a:r>
+              <a:rPr lang="en-US" sz="1400" dirty="0" err="1">
+                <a:latin typeface="Inconsolata" panose="020B0609030003000000" pitchFamily="49" charset="0"/>
+              </a:rPr>
+              <a:t>auth_count</a:t>
+            </a:r>
+            <a:r>
+              <a:rPr lang="en-US" sz="1400" dirty="0">
+                <a:latin typeface="Inconsolata" panose="020B0609030003000000" pitchFamily="49" charset="0"/>
+              </a:rPr>
+              <a:t>++; </a:t>
+            </a:r>
+            <a:r>
+              <a:rPr lang="en-US" sz="1400" dirty="0">
+                <a:solidFill>
+                  <a:schemeClr val="accent2">
+                    <a:lumMod val="75000"/>
+                  </a:schemeClr>
+                </a:solidFill>
+                <a:latin typeface="Inconsolata" panose="020B0609030003000000" pitchFamily="49" charset="0"/>
+              </a:rPr>
+              <a:t>// AES here will be devastating!  </a:t>
+            </a:r>
+            <a:br>
+              <a:rPr lang="en-US" sz="1400" dirty="0">
+                <a:latin typeface="Inconsolata" panose="020B0609030003000000" pitchFamily="49" charset="0"/>
+              </a:rPr>
+            </a:br>
+            <a:r>
+              <a:rPr lang="en-US" sz="1400" dirty="0">
+                <a:latin typeface="Inconsolata" panose="020B0609030003000000" pitchFamily="49" charset="0"/>
+              </a:rPr>
+              <a:t>    </a:t>
+            </a:r>
+            <a:r>
+              <a:rPr lang="en-US" sz="1400" dirty="0" err="1">
+                <a:latin typeface="Inconsolata" panose="020B0609030003000000" pitchFamily="49" charset="0"/>
+              </a:rPr>
+              <a:t>valid_general</a:t>
+            </a:r>
+            <a:r>
+              <a:rPr lang="en-US" sz="1400" dirty="0">
+                <a:latin typeface="Inconsolata" panose="020B0609030003000000" pitchFamily="49" charset="0"/>
+              </a:rPr>
+              <a:t>-&gt;</a:t>
+            </a:r>
+            <a:r>
+              <a:rPr lang="en-US" sz="1400" dirty="0" err="1">
+                <a:latin typeface="Inconsolata" panose="020B0609030003000000" pitchFamily="49" charset="0"/>
+              </a:rPr>
+              <a:t>has_authorized</a:t>
+            </a:r>
+            <a:r>
+              <a:rPr lang="en-US" sz="1400" dirty="0">
+                <a:latin typeface="Inconsolata" panose="020B0609030003000000" pitchFamily="49" charset="0"/>
+              </a:rPr>
+              <a:t> = true; </a:t>
+            </a:r>
+            <a:br>
+              <a:rPr lang="en-US" sz="1400" dirty="0">
+                <a:latin typeface="Inconsolata" panose="020B0609030003000000" pitchFamily="49" charset="0"/>
+              </a:rPr>
+            </a:br>
+            <a:r>
+              <a:rPr lang="en-US" sz="1400" dirty="0">
+                <a:latin typeface="Inconsolata" panose="020B0609030003000000" pitchFamily="49" charset="0"/>
+              </a:rPr>
+              <a:t>  }</a:t>
+            </a:r>
+            <a:r>
+              <a:rPr lang="en-US" sz="1400" dirty="0">
+                <a:solidFill>
+                  <a:srgbClr val="0070C0"/>
+                </a:solidFill>
+                <a:latin typeface="Inconsolata" panose="020B0609030003000000" pitchFamily="49" charset="0"/>
+              </a:rPr>
+              <a:t>else</a:t>
+            </a:r>
+            <a:r>
+              <a:rPr lang="en-US" sz="1400" dirty="0">
+                <a:latin typeface="Inconsolata" panose="020B0609030003000000" pitchFamily="49" charset="0"/>
+              </a:rPr>
+              <a:t>{ </a:t>
+            </a:r>
+            <a:r>
+              <a:rPr lang="en-US" sz="1400" dirty="0">
+                <a:solidFill>
+                  <a:srgbClr val="0070C0"/>
+                </a:solidFill>
+                <a:latin typeface="Inconsolata" panose="020B0609030003000000" pitchFamily="49" charset="0"/>
+              </a:rPr>
+              <a:t>return</a:t>
+            </a:r>
+            <a:r>
+              <a:rPr lang="en-US" sz="1400" dirty="0">
+                <a:latin typeface="Inconsolata" panose="020B0609030003000000" pitchFamily="49" charset="0"/>
+              </a:rPr>
+              <a:t> </a:t>
+            </a:r>
+            <a:r>
+              <a:rPr lang="en-US" sz="1400" dirty="0">
+                <a:solidFill>
+                  <a:srgbClr val="FF0000"/>
+                </a:solidFill>
+                <a:latin typeface="Inconsolata" panose="020B0609030003000000" pitchFamily="49" charset="0"/>
+              </a:rPr>
+              <a:t>GENERAL_ALREADY_AUTHORIZED_ACTION</a:t>
+            </a:r>
+            <a:r>
+              <a:rPr lang="en-US" sz="1400" dirty="0">
+                <a:latin typeface="Inconsolata" panose="020B0609030003000000" pitchFamily="49" charset="0"/>
+              </a:rPr>
+              <a:t>;</a:t>
+            </a:r>
+            <a:r>
+              <a:rPr lang="en-US" sz="1400" dirty="0">
+                <a:solidFill>
+                  <a:schemeClr val="accent2">
+                    <a:lumMod val="75000"/>
+                  </a:schemeClr>
+                </a:solidFill>
+                <a:latin typeface="Inconsolata" panose="020B0609030003000000" pitchFamily="49" charset="0"/>
+              </a:rPr>
+              <a:t>/* replay*/</a:t>
+            </a:r>
+            <a:r>
+              <a:rPr lang="en-US" sz="1400" dirty="0">
+                <a:latin typeface="Inconsolata" panose="020B0609030003000000" pitchFamily="49" charset="0"/>
+              </a:rPr>
+              <a:t>}</a:t>
+            </a:r>
+          </a:p>
+          <a:p>
+            <a:pPr marL="0" indent="0">
+              <a:buNone/>
+            </a:pPr>
+            <a:r>
+              <a:rPr lang="en-US" sz="1400" dirty="0">
+                <a:latin typeface="Inconsolata" panose="020B0609030003000000" pitchFamily="49" charset="0"/>
+              </a:rPr>
+              <a:t>  </a:t>
+            </a:r>
+            <a:r>
+              <a:rPr lang="en-US" sz="1400" dirty="0">
+                <a:solidFill>
+                  <a:srgbClr val="0070C0"/>
+                </a:solidFill>
+                <a:latin typeface="Inconsolata" panose="020B0609030003000000" pitchFamily="49" charset="0"/>
+              </a:rPr>
+              <a:t>if</a:t>
+            </a:r>
+            <a:r>
+              <a:rPr lang="en-US" sz="1400" dirty="0">
+                <a:latin typeface="Inconsolata" panose="020B0609030003000000" pitchFamily="49" charset="0"/>
+              </a:rPr>
+              <a:t>(</a:t>
+            </a:r>
+            <a:r>
+              <a:rPr lang="en-US" sz="1400" dirty="0" err="1">
+                <a:latin typeface="Inconsolata" panose="020B0609030003000000" pitchFamily="49" charset="0"/>
+              </a:rPr>
+              <a:t>auth_count</a:t>
+            </a:r>
+            <a:r>
+              <a:rPr lang="en-US" sz="1400" dirty="0">
+                <a:latin typeface="Inconsolata" panose="020B0609030003000000" pitchFamily="49" charset="0"/>
+              </a:rPr>
+              <a:t> == 2){ </a:t>
+            </a:r>
+            <a:r>
+              <a:rPr lang="en-US" sz="1400" dirty="0">
+                <a:solidFill>
+                  <a:srgbClr val="0070C0"/>
+                </a:solidFill>
+                <a:latin typeface="Inconsolata" panose="020B0609030003000000" pitchFamily="49" charset="0"/>
+              </a:rPr>
+              <a:t>return</a:t>
+            </a:r>
+            <a:r>
+              <a:rPr lang="en-US" sz="1400" dirty="0">
+                <a:latin typeface="Inconsolata" panose="020B0609030003000000" pitchFamily="49" charset="0"/>
+              </a:rPr>
+              <a:t> </a:t>
+            </a:r>
+            <a:r>
+              <a:rPr lang="en-US" sz="1400" dirty="0" err="1">
+                <a:latin typeface="Inconsolata" panose="020B0609030003000000" pitchFamily="49" charset="0"/>
+              </a:rPr>
+              <a:t>nuke_the_kashbah</a:t>
+            </a:r>
+            <a:r>
+              <a:rPr lang="en-US" sz="1400" dirty="0">
+                <a:latin typeface="Inconsolata" panose="020B0609030003000000" pitchFamily="49" charset="0"/>
+              </a:rPr>
+              <a:t>(location); }</a:t>
+            </a:r>
+          </a:p>
+          <a:p>
+            <a:pPr marL="0" indent="0">
+              <a:buNone/>
+            </a:pPr>
+            <a:r>
+              <a:rPr lang="en-US" sz="1400" dirty="0">
+                <a:latin typeface="Inconsolata" panose="020B0609030003000000" pitchFamily="49" charset="0"/>
+              </a:rPr>
+              <a:t>  </a:t>
+            </a:r>
+            <a:r>
+              <a:rPr lang="en-US" sz="1400" dirty="0">
+                <a:solidFill>
+                  <a:srgbClr val="0070C0"/>
+                </a:solidFill>
+                <a:latin typeface="Inconsolata" panose="020B0609030003000000" pitchFamily="49" charset="0"/>
+              </a:rPr>
+              <a:t>return</a:t>
+            </a:r>
+            <a:r>
+              <a:rPr lang="en-US" sz="1400" dirty="0">
+                <a:latin typeface="Inconsolata" panose="020B0609030003000000" pitchFamily="49" charset="0"/>
+              </a:rPr>
+              <a:t> </a:t>
+            </a:r>
+            <a:r>
+              <a:rPr lang="en-US" sz="1400" dirty="0">
+                <a:solidFill>
+                  <a:srgbClr val="FF0000"/>
+                </a:solidFill>
+                <a:latin typeface="Inconsolata" panose="020B0609030003000000" pitchFamily="49" charset="0"/>
+              </a:rPr>
+              <a:t>PENDING_AUTHORIZATION</a:t>
+            </a:r>
+            <a:r>
+              <a:rPr lang="en-US" sz="1400" dirty="0">
+                <a:latin typeface="Inconsolata" panose="020B0609030003000000" pitchFamily="49" charset="0"/>
+              </a:rPr>
+              <a:t>;</a:t>
+            </a:r>
+            <a:br>
+              <a:rPr lang="en-US" sz="1400" dirty="0">
+                <a:latin typeface="Inconsolata" panose="020B0609030003000000" pitchFamily="49" charset="0"/>
+              </a:rPr>
+            </a:br>
+            <a:r>
+              <a:rPr lang="en-US" sz="1400" dirty="0">
+                <a:latin typeface="Inconsolata" panose="020B0609030003000000" pitchFamily="49" charset="0"/>
+              </a:rPr>
+              <a:t>}</a:t>
+            </a:r>
+          </a:p>
+        </p:txBody>
+      </p:sp>
+      <p:sp>
+        <p:nvSpPr>
+          <p:cNvPr id="4" name="Content Placeholder 3">
+            <a:extLst>
+              <a:ext uri="{FF2B5EF4-FFF2-40B4-BE49-F238E27FC236}">
+                <a16:creationId xmlns:a16="http://schemas.microsoft.com/office/drawing/2014/main" id="{3A7F52D8-A372-403E-BB2B-6BB0BF9D18A5}"/>
+              </a:ext>
+            </a:extLst>
+          </p:cNvPr>
+          <p:cNvSpPr>
+            <a:spLocks noGrp="1"/>
+          </p:cNvSpPr>
+          <p:nvPr>
+            <p:ph sz="half" idx="2"/>
+          </p:nvPr>
+        </p:nvSpPr>
+        <p:spPr>
+          <a:xfrm>
+            <a:off x="6443180" y="1644871"/>
+            <a:ext cx="5451764" cy="4351338"/>
+          </a:xfrm>
+        </p:spPr>
+        <p:txBody>
+          <a:bodyPr>
+            <a:noAutofit/>
+          </a:bodyPr>
+          <a:lstStyle/>
+          <a:p>
+            <a:r>
+              <a:rPr lang="en-US" sz="3200" dirty="0"/>
+              <a:t>Attacker runs the same enclave in parallel</a:t>
+            </a:r>
+          </a:p>
+          <a:p>
+            <a:pPr lvl="1"/>
+            <a:r>
+              <a:rPr lang="en-US" sz="2800" dirty="0"/>
+              <a:t>poly(</a:t>
+            </a:r>
+            <a:r>
+              <a:rPr lang="en-US" sz="2800" dirty="0" err="1"/>
+              <a:t>instr</a:t>
+            </a:r>
+            <a:r>
+              <a:rPr lang="en-US" sz="2800" dirty="0"/>
+              <a:t>-count)</a:t>
+            </a:r>
+          </a:p>
+          <a:p>
+            <a:r>
+              <a:rPr lang="en-US" sz="3200" dirty="0"/>
+              <a:t>Randomly interrupt the CPU</a:t>
+            </a:r>
+          </a:p>
+          <a:p>
+            <a:r>
+              <a:rPr lang="en-US" sz="3200" dirty="0"/>
+              <a:t>Make </a:t>
+            </a:r>
+            <a:r>
+              <a:rPr lang="en-US" sz="3200" dirty="0" err="1">
+                <a:latin typeface="Inconsolata" panose="020B0609030003000000" pitchFamily="49" charset="0"/>
+              </a:rPr>
+              <a:t>ecall</a:t>
+            </a:r>
+            <a:r>
+              <a:rPr lang="en-US" sz="3200" dirty="0"/>
+              <a:t> with same input parameter</a:t>
+            </a:r>
+          </a:p>
+          <a:p>
+            <a:r>
+              <a:rPr lang="en-US" sz="3200" dirty="0"/>
+              <a:t>With multiple threads, one might be able to exploit </a:t>
+            </a:r>
+            <a:r>
+              <a:rPr lang="en-US" sz="3200" dirty="0" err="1"/>
+              <a:t>PoK</a:t>
+            </a:r>
+            <a:r>
+              <a:rPr lang="en-US" sz="3200" dirty="0"/>
+              <a:t> protocols</a:t>
+            </a:r>
+          </a:p>
+        </p:txBody>
+      </p:sp>
+      <p:sp>
+        <p:nvSpPr>
+          <p:cNvPr id="5" name="Arrow: Right 4">
+            <a:extLst>
+              <a:ext uri="{FF2B5EF4-FFF2-40B4-BE49-F238E27FC236}">
+                <a16:creationId xmlns:a16="http://schemas.microsoft.com/office/drawing/2014/main" id="{7AA8A8EA-444F-489B-B7FC-07F2A8DB23CD}"/>
+              </a:ext>
+            </a:extLst>
+          </p:cNvPr>
+          <p:cNvSpPr/>
+          <p:nvPr/>
+        </p:nvSpPr>
+        <p:spPr>
+          <a:xfrm>
+            <a:off x="141804" y="4893019"/>
+            <a:ext cx="542773" cy="456465"/>
+          </a:xfrm>
+          <a:prstGeom prst="rightArrow">
+            <a:avLst/>
+          </a:prstGeom>
+          <a:solidFill>
+            <a:srgbClr val="FF0000"/>
+          </a:solidFill>
+          <a:ln>
+            <a:solidFill>
+              <a:srgbClr val="C00000"/>
+            </a:solidFill>
+          </a:ln>
+        </p:spPr>
+        <p:style>
+          <a:lnRef idx="2">
+            <a:schemeClr val="accent1">
+              <a:shade val="50000"/>
+            </a:schemeClr>
+          </a:lnRef>
+          <a:fillRef idx="1">
+            <a:schemeClr val="accent1"/>
+          </a:fillRef>
+          <a:effectRef idx="0">
+            <a:schemeClr val="accent1"/>
+          </a:effectRef>
+          <a:fontRef idx="minor">
+            <a:schemeClr val="lt1"/>
+          </a:fontRef>
+        </p:style>
+        <p:txBody>
+          <a:bodyPr rtlCol="0" anchor="ctr"/>
+          <a:lstStyle/>
+          <a:p>
+            <a:pPr algn="ctr"/>
+            <a:endParaRPr lang="en-US"/>
+          </a:p>
+        </p:txBody>
+      </p:sp>
+    </p:spTree>
+    <p:extLst>
+      <p:ext uri="{BB962C8B-B14F-4D97-AF65-F5344CB8AC3E}">
+        <p14:creationId xmlns:p14="http://schemas.microsoft.com/office/powerpoint/2010/main" val="1856144372"/>
+      </p:ext>
+    </p:extLst>
+  </p:cSld>
+  <p:clrMapOvr>
+    <a:masterClrMapping/>
+  </p:clrMapOvr>
+  <p:timing>
+    <p:tnLst>
+      <p:par>
+        <p:cTn id="1" dur="indefinite" restart="never" nodeType="tmRoot">
+          <p:childTnLst>
+            <p:seq concurrent="1" nextAc="seek">
+              <p:cTn id="2" dur="indefinite" nodeType="mainSeq">
+                <p:childTnLst>
+                  <p:par>
+                    <p:cTn id="3" fill="hold">
+                      <p:stCondLst>
+                        <p:cond delay="indefinite"/>
+                      </p:stCondLst>
+                      <p:childTnLst>
+                        <p:par>
+                          <p:cTn id="4" fill="hold">
+                            <p:stCondLst>
+                              <p:cond delay="0"/>
+                            </p:stCondLst>
+                            <p:childTnLst>
+                              <p:par>
+                                <p:cTn id="5" presetID="1" presetClass="entr" presetSubtype="0" fill="hold" grpId="0" nodeType="clickEffect">
+                                  <p:stCondLst>
+                                    <p:cond delay="0"/>
+                                  </p:stCondLst>
+                                  <p:childTnLst>
+                                    <p:set>
+                                      <p:cBhvr>
+                                        <p:cTn id="6" dur="1" fill="hold">
+                                          <p:stCondLst>
+                                            <p:cond delay="0"/>
+                                          </p:stCondLst>
+                                        </p:cTn>
+                                        <p:tgtEl>
+                                          <p:spTgt spid="5"/>
+                                        </p:tgtEl>
+                                        <p:attrNameLst>
+                                          <p:attrName>style.visibility</p:attrName>
+                                        </p:attrNameLst>
+                                      </p:cBhvr>
+                                      <p:to>
+                                        <p:strVal val="visible"/>
+                                      </p:to>
+                                    </p:set>
+                                  </p:childTnLst>
+                                </p:cTn>
+                              </p:par>
+                            </p:childTnLst>
+                          </p:cTn>
+                        </p:par>
+                      </p:childTnLst>
+                    </p:cTn>
+                  </p:par>
+                  <p:par>
+                    <p:cTn id="7" fill="hold">
+                      <p:stCondLst>
+                        <p:cond delay="indefinite"/>
+                      </p:stCondLst>
+                      <p:childTnLst>
+                        <p:par>
+                          <p:cTn id="8" fill="hold">
+                            <p:stCondLst>
+                              <p:cond delay="0"/>
+                            </p:stCondLst>
+                            <p:childTnLst>
+                              <p:par>
+                                <p:cTn id="9" presetID="26" presetClass="emph" presetSubtype="0" fill="hold" grpId="1" nodeType="clickEffect">
+                                  <p:stCondLst>
+                                    <p:cond delay="0"/>
+                                  </p:stCondLst>
+                                  <p:childTnLst>
+                                    <p:animEffect transition="out" filter="fade">
+                                      <p:cBhvr>
+                                        <p:cTn id="10" dur="500" tmFilter="0, 0; .2, .5; .8, .5; 1, 0"/>
+                                        <p:tgtEl>
+                                          <p:spTgt spid="5"/>
+                                        </p:tgtEl>
+                                      </p:cBhvr>
+                                    </p:animEffect>
+                                    <p:animScale>
+                                      <p:cBhvr>
+                                        <p:cTn id="11" dur="250" autoRev="1" fill="hold"/>
+                                        <p:tgtEl>
+                                          <p:spTgt spid="5"/>
+                                        </p:tgtEl>
+                                      </p:cBhvr>
+                                      <p:by x="105000" y="105000"/>
+                                    </p:animScale>
+                                  </p:childTnLst>
+                                </p:cTn>
+                              </p:par>
+                            </p:childTnLst>
+                          </p:cTn>
+                        </p:par>
+                      </p:childTnLst>
+                    </p:cTn>
+                  </p:par>
+                </p:childTnLst>
+              </p:cTn>
+              <p:prevCondLst>
+                <p:cond evt="onPrev" delay="0">
+                  <p:tgtEl>
+                    <p:sldTgt/>
+                  </p:tgtEl>
+                </p:cond>
+              </p:prevCondLst>
+              <p:nextCondLst>
+                <p:cond evt="onNext" delay="0">
+                  <p:tgtEl>
+                    <p:sldTgt/>
+                  </p:tgtEl>
+                </p:cond>
+              </p:nextCondLst>
+            </p:seq>
+          </p:childTnLst>
+        </p:cTn>
+      </p:par>
+    </p:tnLst>
+    <p:bldLst>
+      <p:bldP spid="5" grpId="0" animBg="1"/>
+      <p:bldP spid="5" grpId="1" animBg="1"/>
+    </p:bldLst>
+  </p:timing>
+</p:sld>
+</file>
+
+<file path=ppt/slides/slide8.xml><?xml version="1.0" encoding="utf-8"?>
+<p:sld xmlns:a="http://schemas.openxmlformats.org/drawingml/2006/main" xmlns:r="http://schemas.openxmlformats.org/officeDocument/2006/relationships" xmlns:p="http://schemas.openxmlformats.org/presentationml/2006/main">
+  <p:cSld>
+    <p:spTree>
+      <p:nvGrpSpPr>
+        <p:cNvPr id="1" name=""/>
+        <p:cNvGrpSpPr/>
+        <p:nvPr/>
+      </p:nvGrpSpPr>
+      <p:grpSpPr>
+        <a:xfrm>
+          <a:off x="0" y="0"/>
+          <a:ext cx="0" cy="0"/>
+          <a:chOff x="0" y="0"/>
+          <a:chExt cx="0" cy="0"/>
+        </a:xfrm>
+      </p:grpSpPr>
+      <p:sp>
+        <p:nvSpPr>
+          <p:cNvPr id="2" name="Title 1">
+            <a:extLst>
+              <a:ext uri="{FF2B5EF4-FFF2-40B4-BE49-F238E27FC236}">
+                <a16:creationId xmlns:a16="http://schemas.microsoft.com/office/drawing/2014/main" id="{9433F1A9-725A-4FF9-B871-4233FCB145FA}"/>
+              </a:ext>
+            </a:extLst>
+          </p:cNvPr>
+          <p:cNvSpPr>
+            <a:spLocks noGrp="1"/>
+          </p:cNvSpPr>
+          <p:nvPr>
+            <p:ph type="title"/>
+          </p:nvPr>
+        </p:nvSpPr>
+        <p:spPr/>
+        <p:txBody>
+          <a:bodyPr/>
+          <a:lstStyle/>
+          <a:p>
+            <a:pPr algn="r"/>
+            <a:r>
+              <a:rPr lang="en-US" dirty="0">
+                <a:solidFill>
+                  <a:schemeClr val="bg1"/>
+                </a:solidFill>
+              </a:rPr>
+              <a:t>SGX Remote Attestation</a:t>
+            </a:r>
+          </a:p>
+        </p:txBody>
+      </p:sp>
+      <p:sp>
+        <p:nvSpPr>
+          <p:cNvPr id="3" name="Content Placeholder 2">
+            <a:extLst>
+              <a:ext uri="{FF2B5EF4-FFF2-40B4-BE49-F238E27FC236}">
+                <a16:creationId xmlns:a16="http://schemas.microsoft.com/office/drawing/2014/main" id="{F81C2423-D8B1-49D2-A773-69BB2E088CB7}"/>
+              </a:ext>
+            </a:extLst>
+          </p:cNvPr>
+          <p:cNvSpPr>
+            <a:spLocks noGrp="1"/>
+          </p:cNvSpPr>
+          <p:nvPr>
+            <p:ph idx="1"/>
+          </p:nvPr>
+        </p:nvSpPr>
+        <p:spPr/>
+        <p:txBody>
+          <a:bodyPr/>
+          <a:lstStyle/>
+          <a:p>
+            <a:endParaRPr lang="en-US" dirty="0"/>
+          </a:p>
+        </p:txBody>
+      </p:sp>
+    </p:spTree>
+    <p:extLst>
+      <p:ext uri="{BB962C8B-B14F-4D97-AF65-F5344CB8AC3E}">
+        <p14:creationId xmlns:p14="http://schemas.microsoft.com/office/powerpoint/2010/main" val="684035952"/>
+      </p:ext>
+    </p:extLst>
+  </p:cSld>
+  <p:clrMapOvr>
+    <a:masterClrMapping/>
+  </p:clrMapOvr>
+</p:sld>
+</file>
+
+<file path=ppt/slides/slide9.xml><?xml version="1.0" encoding="utf-8"?>
+<p:sld xmlns:a="http://schemas.openxmlformats.org/drawingml/2006/main" xmlns:r="http://schemas.openxmlformats.org/officeDocument/2006/relationships" xmlns:p="http://schemas.openxmlformats.org/presentationml/2006/main">
+  <p:cSld>
+    <p:spTree>
+      <p:nvGrpSpPr>
+        <p:cNvPr id="1" name=""/>
+        <p:cNvGrpSpPr/>
+        <p:nvPr/>
+      </p:nvGrpSpPr>
+      <p:grpSpPr>
+        <a:xfrm>
+          <a:off x="0" y="0"/>
+          <a:ext cx="0" cy="0"/>
+          <a:chOff x="0" y="0"/>
+          <a:chExt cx="0" cy="0"/>
+        </a:xfrm>
+      </p:grpSpPr>
+      <p:sp>
+        <p:nvSpPr>
+          <p:cNvPr id="2" name="Title 1">
+            <a:extLst>
+              <a:ext uri="{FF2B5EF4-FFF2-40B4-BE49-F238E27FC236}">
+                <a16:creationId xmlns:a16="http://schemas.microsoft.com/office/drawing/2014/main" id="{D07508BC-BF03-4430-AF11-EAA992AE8E28}"/>
+              </a:ext>
+            </a:extLst>
+          </p:cNvPr>
+          <p:cNvSpPr>
+            <a:spLocks noGrp="1"/>
+          </p:cNvSpPr>
+          <p:nvPr>
+            <p:ph type="title"/>
+          </p:nvPr>
+        </p:nvSpPr>
+        <p:spPr/>
+        <p:txBody>
+          <a:bodyPr/>
+          <a:lstStyle/>
+          <a:p>
+            <a:pPr algn="r"/>
+            <a:r>
+              <a:rPr lang="en-US" dirty="0">
+                <a:solidFill>
+                  <a:schemeClr val="bg1"/>
+                </a:solidFill>
+              </a:rPr>
+              <a:t>SGX Key Hierarchy</a:t>
+            </a:r>
+          </a:p>
+        </p:txBody>
+      </p:sp>
+    </p:spTree>
+    <p:extLst>
+      <p:ext uri="{BB962C8B-B14F-4D97-AF65-F5344CB8AC3E}">
+        <p14:creationId xmlns:p14="http://schemas.microsoft.com/office/powerpoint/2010/main" val="1750362385"/>
       </p:ext>
     </p:extLst>
   </p:cSld>

</xml_diff>